<commit_message>
update to recession ppt
</commit_message>
<xml_diff>
--- a/Project-Presentation.pptx
+++ b/Project-Presentation.pptx
@@ -7,15 +7,16 @@
   <p:sldIdLst>
     <p:sldId id="256" r:id="rId2"/>
     <p:sldId id="259" r:id="rId3"/>
-    <p:sldId id="265" r:id="rId4"/>
-    <p:sldId id="266" r:id="rId5"/>
-    <p:sldId id="260" r:id="rId6"/>
-    <p:sldId id="261" r:id="rId7"/>
-    <p:sldId id="262" r:id="rId8"/>
-    <p:sldId id="263" r:id="rId9"/>
-    <p:sldId id="264" r:id="rId10"/>
-    <p:sldId id="268" r:id="rId11"/>
-    <p:sldId id="267" r:id="rId12"/>
+    <p:sldId id="269" r:id="rId4"/>
+    <p:sldId id="265" r:id="rId5"/>
+    <p:sldId id="266" r:id="rId6"/>
+    <p:sldId id="260" r:id="rId7"/>
+    <p:sldId id="261" r:id="rId8"/>
+    <p:sldId id="262" r:id="rId9"/>
+    <p:sldId id="263" r:id="rId10"/>
+    <p:sldId id="264" r:id="rId11"/>
+    <p:sldId id="268" r:id="rId12"/>
+    <p:sldId id="267" r:id="rId13"/>
   </p:sldIdLst>
   <p:sldSz cx="12192000" cy="6858000"/>
   <p:notesSz cx="6858000" cy="9144000"/>
@@ -4517,13 +4518,13 @@
         </p:spPr>
         <p:txBody>
           <a:bodyPr>
-            <a:normAutofit/>
+            <a:noAutofit/>
           </a:bodyPr>
           <a:lstStyle/>
           <a:p>
             <a:r>
-              <a:rPr lang="en-US" sz="3200" dirty="0"/>
-              <a:t>Economic Climate: Outliers</a:t>
+              <a:rPr lang="en-US" sz="3600" dirty="0"/>
+              <a:t>Economic Climate: Impact of Recessions on Prices</a:t>
             </a:r>
           </a:p>
         </p:txBody>
@@ -5166,6 +5167,144 @@
           </a:p>
         </p:txBody>
       </p:sp>
+      <p:pic>
+        <p:nvPicPr>
+          <p:cNvPr id="4" name="Picture 3">
+            <a:extLst>
+              <a:ext uri="{FF2B5EF4-FFF2-40B4-BE49-F238E27FC236}">
+                <a16:creationId xmlns:a16="http://schemas.microsoft.com/office/drawing/2014/main" id="{5CC1124C-193E-070D-4BA5-FC981E651F43}"/>
+              </a:ext>
+            </a:extLst>
+          </p:cNvPr>
+          <p:cNvPicPr>
+            <a:picLocks noChangeAspect="1"/>
+          </p:cNvPicPr>
+          <p:nvPr/>
+        </p:nvPicPr>
+        <p:blipFill>
+          <a:blip r:embed="rId2"/>
+          <a:stretch>
+            <a:fillRect/>
+          </a:stretch>
+        </p:blipFill>
+        <p:spPr>
+          <a:xfrm>
+            <a:off x="798095" y="3026119"/>
+            <a:ext cx="4818212" cy="3463090"/>
+          </a:xfrm>
+          <a:prstGeom prst="rect">
+            <a:avLst/>
+          </a:prstGeom>
+        </p:spPr>
+      </p:pic>
+      <p:pic>
+        <p:nvPicPr>
+          <p:cNvPr id="5" name="Picture 4">
+            <a:extLst>
+              <a:ext uri="{FF2B5EF4-FFF2-40B4-BE49-F238E27FC236}">
+                <a16:creationId xmlns:a16="http://schemas.microsoft.com/office/drawing/2014/main" id="{E736500A-40C2-ADC1-1678-AE62FBA340EE}"/>
+              </a:ext>
+            </a:extLst>
+          </p:cNvPr>
+          <p:cNvPicPr>
+            <a:picLocks noChangeAspect="1"/>
+          </p:cNvPicPr>
+          <p:nvPr/>
+        </p:nvPicPr>
+        <p:blipFill>
+          <a:blip r:embed="rId3"/>
+          <a:stretch>
+            <a:fillRect/>
+          </a:stretch>
+        </p:blipFill>
+        <p:spPr>
+          <a:xfrm>
+            <a:off x="6304547" y="3026119"/>
+            <a:ext cx="4957011" cy="3497586"/>
+          </a:xfrm>
+          <a:prstGeom prst="rect">
+            <a:avLst/>
+          </a:prstGeom>
+        </p:spPr>
+      </p:pic>
+      <p:cxnSp>
+        <p:nvCxnSpPr>
+          <p:cNvPr id="6" name="Straight Connector 5">
+            <a:extLst>
+              <a:ext uri="{FF2B5EF4-FFF2-40B4-BE49-F238E27FC236}">
+                <a16:creationId xmlns:a16="http://schemas.microsoft.com/office/drawing/2014/main" id="{60510445-17A5-C9B6-C228-80BB83FA8AA1}"/>
+              </a:ext>
+            </a:extLst>
+          </p:cNvPr>
+          <p:cNvCxnSpPr>
+            <a:cxnSpLocks/>
+          </p:cNvCxnSpPr>
+          <p:nvPr/>
+        </p:nvCxnSpPr>
+        <p:spPr>
+          <a:xfrm>
+            <a:off x="6930189" y="4661895"/>
+            <a:ext cx="4155627" cy="0"/>
+          </a:xfrm>
+          <a:prstGeom prst="line">
+            <a:avLst/>
+          </a:prstGeom>
+          <a:ln w="28575"/>
+        </p:spPr>
+        <p:style>
+          <a:lnRef idx="1">
+            <a:schemeClr val="accent2"/>
+          </a:lnRef>
+          <a:fillRef idx="0">
+            <a:schemeClr val="accent2"/>
+          </a:fillRef>
+          <a:effectRef idx="0">
+            <a:schemeClr val="accent2"/>
+          </a:effectRef>
+          <a:fontRef idx="minor">
+            <a:schemeClr val="tx1"/>
+          </a:fontRef>
+        </p:style>
+      </p:cxnSp>
+      <p:cxnSp>
+        <p:nvCxnSpPr>
+          <p:cNvPr id="7" name="Straight Connector 6">
+            <a:extLst>
+              <a:ext uri="{FF2B5EF4-FFF2-40B4-BE49-F238E27FC236}">
+                <a16:creationId xmlns:a16="http://schemas.microsoft.com/office/drawing/2014/main" id="{BC191EFD-5994-9240-F2DB-49FE0E291BC0}"/>
+              </a:ext>
+            </a:extLst>
+          </p:cNvPr>
+          <p:cNvCxnSpPr>
+            <a:cxnSpLocks/>
+          </p:cNvCxnSpPr>
+          <p:nvPr/>
+        </p:nvCxnSpPr>
+        <p:spPr>
+          <a:xfrm>
+            <a:off x="1339336" y="5584858"/>
+            <a:ext cx="4116242" cy="0"/>
+          </a:xfrm>
+          <a:prstGeom prst="line">
+            <a:avLst/>
+          </a:prstGeom>
+          <a:ln w="28575"/>
+        </p:spPr>
+        <p:style>
+          <a:lnRef idx="1">
+            <a:schemeClr val="accent2"/>
+          </a:lnRef>
+          <a:fillRef idx="0">
+            <a:schemeClr val="accent2"/>
+          </a:fillRef>
+          <a:effectRef idx="0">
+            <a:schemeClr val="accent2"/>
+          </a:effectRef>
+          <a:fontRef idx="minor">
+            <a:schemeClr val="tx1"/>
+          </a:fontRef>
+        </p:style>
+      </p:cxnSp>
       <p:sp>
         <p:nvSpPr>
           <p:cNvPr id="9" name="Content Placeholder 2">
@@ -5198,8 +5337,8 @@
               <a:buNone/>
             </a:pPr>
             <a:r>
-              <a:rPr lang="en-US" sz="2200" dirty="0"/>
-              <a:t>Recession resistance: upper outliers that grew the most during recession years</a:t>
+              <a:rPr lang="en-US" sz="1800" dirty="0"/>
+              <a:t>Recessions reduce growth (1.1% vs 5.0% in non-recession markets)</a:t>
             </a:r>
           </a:p>
           <a:p>
@@ -5207,16 +5346,842 @@
               <a:buNone/>
             </a:pPr>
             <a:r>
-              <a:rPr lang="en-US" sz="2200" dirty="0"/>
-              <a:t>Declining spaces: lower outliers that lost the most during non-recession years</a:t>
+              <a:rPr lang="en-US" sz="1800" dirty="0"/>
+              <a:t>Some ZIP-codes grew even during recessions</a:t>
             </a:r>
           </a:p>
+        </p:txBody>
+      </p:sp>
+    </p:spTree>
+    <p:extLst>
+      <p:ext uri="{BB962C8B-B14F-4D97-AF65-F5344CB8AC3E}">
+        <p14:creationId xmlns:p14="http://schemas.microsoft.com/office/powerpoint/2010/main" val="821663497"/>
+      </p:ext>
+    </p:extLst>
+  </p:cSld>
+  <p:clrMapOvr>
+    <a:masterClrMapping/>
+  </p:clrMapOvr>
+</p:sld>
+</file>
+
+<file path=ppt/slides/slide11.xml><?xml version="1.0" encoding="utf-8"?>
+<p:sld xmlns:a="http://schemas.openxmlformats.org/drawingml/2006/main" xmlns:r="http://schemas.openxmlformats.org/officeDocument/2006/relationships" xmlns:p="http://schemas.openxmlformats.org/presentationml/2006/main">
+  <p:cSld>
+    <p:bg>
+      <p:bgPr>
+        <a:solidFill>
+          <a:schemeClr val="bg1"/>
+        </a:solidFill>
+        <a:effectLst/>
+      </p:bgPr>
+    </p:bg>
+    <p:spTree>
+      <p:nvGrpSpPr>
+        <p:cNvPr id="1" name=""/>
+        <p:cNvGrpSpPr/>
+        <p:nvPr/>
+      </p:nvGrpSpPr>
+      <p:grpSpPr>
+        <a:xfrm>
+          <a:off x="0" y="0"/>
+          <a:ext cx="0" cy="0"/>
+          <a:chOff x="0" y="0"/>
+          <a:chExt cx="0" cy="0"/>
+        </a:xfrm>
+      </p:grpSpPr>
+      <p:sp useBgFill="1">
+        <p:nvSpPr>
+          <p:cNvPr id="8" name="Rectangle 7">
+            <a:extLst>
+              <a:ext uri="{FF2B5EF4-FFF2-40B4-BE49-F238E27FC236}">
+                <a16:creationId xmlns:a16="http://schemas.microsoft.com/office/drawing/2014/main" id="{100EDD19-6802-4EC3-95CE-CFFAB042CFD6}"/>
+              </a:ext>
+              <a:ext uri="{C183D7F6-B498-43B3-948B-1728B52AA6E4}">
+                <adec:decorative xmlns:adec="http://schemas.microsoft.com/office/drawing/2017/decorative" val="1"/>
+              </a:ext>
+            </a:extLst>
+          </p:cNvPr>
+          <p:cNvSpPr>
+            <a:spLocks noGrp="1" noRot="1" noChangeAspect="1" noMove="1" noResize="1" noEditPoints="1" noAdjustHandles="1" noChangeArrowheads="1" noChangeShapeType="1" noTextEdit="1"/>
+          </p:cNvSpPr>
+          <p:nvPr>
+            <p:extLst>
+              <p:ext uri="{386F3935-93C4-4BCD-93E2-E3B085C9AB24}">
+                <p16:designElem xmlns:p16="http://schemas.microsoft.com/office/powerpoint/2015/main" val="1"/>
+              </p:ext>
+            </p:extLst>
+          </p:nvPr>
+        </p:nvSpPr>
+        <p:spPr>
+          <a:xfrm>
+            <a:off x="0" y="0"/>
+            <a:ext cx="12188952" cy="6858000"/>
+          </a:xfrm>
+          <a:prstGeom prst="rect">
+            <a:avLst/>
+          </a:prstGeom>
+          <a:ln>
+            <a:noFill/>
+          </a:ln>
+        </p:spPr>
+        <p:style>
+          <a:lnRef idx="2">
+            <a:schemeClr val="accent1">
+              <a:shade val="50000"/>
+            </a:schemeClr>
+          </a:lnRef>
+          <a:fillRef idx="1">
+            <a:schemeClr val="accent1"/>
+          </a:fillRef>
+          <a:effectRef idx="0">
+            <a:schemeClr val="accent1"/>
+          </a:effectRef>
+          <a:fontRef idx="minor">
+            <a:schemeClr val="lt1"/>
+          </a:fontRef>
+        </p:style>
+        <p:txBody>
+          <a:bodyPr rtlCol="0" anchor="ctr"/>
+          <a:lstStyle/>
+          <a:p>
+            <a:pPr algn="ctr"/>
+            <a:endParaRPr lang="en-US"/>
+          </a:p>
+        </p:txBody>
+      </p:sp>
+      <p:sp>
+        <p:nvSpPr>
+          <p:cNvPr id="2" name="Title 1">
+            <a:extLst>
+              <a:ext uri="{FF2B5EF4-FFF2-40B4-BE49-F238E27FC236}">
+                <a16:creationId xmlns:a16="http://schemas.microsoft.com/office/drawing/2014/main" id="{F61A8933-A8F5-1FF0-048E-77BD345837BA}"/>
+              </a:ext>
+            </a:extLst>
+          </p:cNvPr>
+          <p:cNvSpPr>
+            <a:spLocks noGrp="1"/>
+          </p:cNvSpPr>
+          <p:nvPr>
+            <p:ph type="title"/>
+          </p:nvPr>
+        </p:nvSpPr>
+        <p:spPr>
+          <a:xfrm>
+            <a:off x="838200" y="365125"/>
+            <a:ext cx="10515600" cy="1325563"/>
+          </a:xfrm>
+        </p:spPr>
+        <p:txBody>
+          <a:bodyPr>
+            <a:normAutofit/>
+          </a:bodyPr>
+          <a:lstStyle/>
+          <a:p>
+            <a:r>
+              <a:rPr lang="en-US" sz="3200" dirty="0"/>
+              <a:t>Economic Climate: Outliers</a:t>
+            </a:r>
+          </a:p>
+        </p:txBody>
+      </p:sp>
+      <p:sp>
+        <p:nvSpPr>
+          <p:cNvPr id="10" name="sketch line">
+            <a:extLst>
+              <a:ext uri="{FF2B5EF4-FFF2-40B4-BE49-F238E27FC236}">
+                <a16:creationId xmlns:a16="http://schemas.microsoft.com/office/drawing/2014/main" id="{DB17E863-922E-4C26-BD64-E8FD41D28661}"/>
+              </a:ext>
+              <a:ext uri="{C183D7F6-B498-43B3-948B-1728B52AA6E4}">
+                <adec:decorative xmlns:adec="http://schemas.microsoft.com/office/drawing/2017/decorative" val="1"/>
+              </a:ext>
+            </a:extLst>
+          </p:cNvPr>
+          <p:cNvSpPr>
+            <a:spLocks noGrp="1" noRot="1" noChangeAspect="1" noMove="1" noResize="1" noEditPoints="1" noAdjustHandles="1" noChangeArrowheads="1" noChangeShapeType="1" noTextEdit="1"/>
+          </p:cNvSpPr>
+          <p:nvPr>
+            <p:extLst>
+              <p:ext uri="{386F3935-93C4-4BCD-93E2-E3B085C9AB24}">
+                <p16:designElem xmlns:p16="http://schemas.microsoft.com/office/powerpoint/2015/main" val="1"/>
+              </p:ext>
+            </p:extLst>
+          </p:nvPr>
+        </p:nvSpPr>
+        <p:spPr>
+          <a:xfrm>
+            <a:off x="669036" y="1677373"/>
+            <a:ext cx="10853928" cy="18288"/>
+          </a:xfrm>
+          <a:custGeom>
+            <a:avLst/>
+            <a:gdLst>
+              <a:gd name="connsiteX0" fmla="*/ 0 w 10853928"/>
+              <a:gd name="connsiteY0" fmla="*/ 0 h 18288"/>
+              <a:gd name="connsiteX1" fmla="*/ 461292 w 10853928"/>
+              <a:gd name="connsiteY1" fmla="*/ 0 h 18288"/>
+              <a:gd name="connsiteX2" fmla="*/ 1139662 w 10853928"/>
+              <a:gd name="connsiteY2" fmla="*/ 0 h 18288"/>
+              <a:gd name="connsiteX3" fmla="*/ 1926572 w 10853928"/>
+              <a:gd name="connsiteY3" fmla="*/ 0 h 18288"/>
+              <a:gd name="connsiteX4" fmla="*/ 2279325 w 10853928"/>
+              <a:gd name="connsiteY4" fmla="*/ 0 h 18288"/>
+              <a:gd name="connsiteX5" fmla="*/ 2632078 w 10853928"/>
+              <a:gd name="connsiteY5" fmla="*/ 0 h 18288"/>
+              <a:gd name="connsiteX6" fmla="*/ 3527527 w 10853928"/>
+              <a:gd name="connsiteY6" fmla="*/ 0 h 18288"/>
+              <a:gd name="connsiteX7" fmla="*/ 4205897 w 10853928"/>
+              <a:gd name="connsiteY7" fmla="*/ 0 h 18288"/>
+              <a:gd name="connsiteX8" fmla="*/ 4558650 w 10853928"/>
+              <a:gd name="connsiteY8" fmla="*/ 0 h 18288"/>
+              <a:gd name="connsiteX9" fmla="*/ 5237020 w 10853928"/>
+              <a:gd name="connsiteY9" fmla="*/ 0 h 18288"/>
+              <a:gd name="connsiteX10" fmla="*/ 6132469 w 10853928"/>
+              <a:gd name="connsiteY10" fmla="*/ 0 h 18288"/>
+              <a:gd name="connsiteX11" fmla="*/ 6702301 w 10853928"/>
+              <a:gd name="connsiteY11" fmla="*/ 0 h 18288"/>
+              <a:gd name="connsiteX12" fmla="*/ 7272132 w 10853928"/>
+              <a:gd name="connsiteY12" fmla="*/ 0 h 18288"/>
+              <a:gd name="connsiteX13" fmla="*/ 7950502 w 10853928"/>
+              <a:gd name="connsiteY13" fmla="*/ 0 h 18288"/>
+              <a:gd name="connsiteX14" fmla="*/ 8737412 w 10853928"/>
+              <a:gd name="connsiteY14" fmla="*/ 0 h 18288"/>
+              <a:gd name="connsiteX15" fmla="*/ 9524322 w 10853928"/>
+              <a:gd name="connsiteY15" fmla="*/ 0 h 18288"/>
+              <a:gd name="connsiteX16" fmla="*/ 10853928 w 10853928"/>
+              <a:gd name="connsiteY16" fmla="*/ 0 h 18288"/>
+              <a:gd name="connsiteX17" fmla="*/ 10853928 w 10853928"/>
+              <a:gd name="connsiteY17" fmla="*/ 18288 h 18288"/>
+              <a:gd name="connsiteX18" fmla="*/ 10392636 w 10853928"/>
+              <a:gd name="connsiteY18" fmla="*/ 18288 h 18288"/>
+              <a:gd name="connsiteX19" fmla="*/ 9497187 w 10853928"/>
+              <a:gd name="connsiteY19" fmla="*/ 18288 h 18288"/>
+              <a:gd name="connsiteX20" fmla="*/ 8818817 w 10853928"/>
+              <a:gd name="connsiteY20" fmla="*/ 18288 h 18288"/>
+              <a:gd name="connsiteX21" fmla="*/ 8466064 w 10853928"/>
+              <a:gd name="connsiteY21" fmla="*/ 18288 h 18288"/>
+              <a:gd name="connsiteX22" fmla="*/ 7787693 w 10853928"/>
+              <a:gd name="connsiteY22" fmla="*/ 18288 h 18288"/>
+              <a:gd name="connsiteX23" fmla="*/ 7217862 w 10853928"/>
+              <a:gd name="connsiteY23" fmla="*/ 18288 h 18288"/>
+              <a:gd name="connsiteX24" fmla="*/ 6648031 w 10853928"/>
+              <a:gd name="connsiteY24" fmla="*/ 18288 h 18288"/>
+              <a:gd name="connsiteX25" fmla="*/ 6078200 w 10853928"/>
+              <a:gd name="connsiteY25" fmla="*/ 18288 h 18288"/>
+              <a:gd name="connsiteX26" fmla="*/ 5508368 w 10853928"/>
+              <a:gd name="connsiteY26" fmla="*/ 18288 h 18288"/>
+              <a:gd name="connsiteX27" fmla="*/ 4721459 w 10853928"/>
+              <a:gd name="connsiteY27" fmla="*/ 18288 h 18288"/>
+              <a:gd name="connsiteX28" fmla="*/ 4043088 w 10853928"/>
+              <a:gd name="connsiteY28" fmla="*/ 18288 h 18288"/>
+              <a:gd name="connsiteX29" fmla="*/ 3690336 w 10853928"/>
+              <a:gd name="connsiteY29" fmla="*/ 18288 h 18288"/>
+              <a:gd name="connsiteX30" fmla="*/ 3120504 w 10853928"/>
+              <a:gd name="connsiteY30" fmla="*/ 18288 h 18288"/>
+              <a:gd name="connsiteX31" fmla="*/ 2333595 w 10853928"/>
+              <a:gd name="connsiteY31" fmla="*/ 18288 h 18288"/>
+              <a:gd name="connsiteX32" fmla="*/ 1872303 w 10853928"/>
+              <a:gd name="connsiteY32" fmla="*/ 18288 h 18288"/>
+              <a:gd name="connsiteX33" fmla="*/ 976854 w 10853928"/>
+              <a:gd name="connsiteY33" fmla="*/ 18288 h 18288"/>
+              <a:gd name="connsiteX34" fmla="*/ 0 w 10853928"/>
+              <a:gd name="connsiteY34" fmla="*/ 18288 h 18288"/>
+              <a:gd name="connsiteX35" fmla="*/ 0 w 10853928"/>
+              <a:gd name="connsiteY35" fmla="*/ 0 h 18288"/>
+            </a:gdLst>
+            <a:ahLst/>
+            <a:cxnLst>
+              <a:cxn ang="0">
+                <a:pos x="connsiteX0" y="connsiteY0"/>
+              </a:cxn>
+              <a:cxn ang="0">
+                <a:pos x="connsiteX1" y="connsiteY1"/>
+              </a:cxn>
+              <a:cxn ang="0">
+                <a:pos x="connsiteX2" y="connsiteY2"/>
+              </a:cxn>
+              <a:cxn ang="0">
+                <a:pos x="connsiteX3" y="connsiteY3"/>
+              </a:cxn>
+              <a:cxn ang="0">
+                <a:pos x="connsiteX4" y="connsiteY4"/>
+              </a:cxn>
+              <a:cxn ang="0">
+                <a:pos x="connsiteX5" y="connsiteY5"/>
+              </a:cxn>
+              <a:cxn ang="0">
+                <a:pos x="connsiteX6" y="connsiteY6"/>
+              </a:cxn>
+              <a:cxn ang="0">
+                <a:pos x="connsiteX7" y="connsiteY7"/>
+              </a:cxn>
+              <a:cxn ang="0">
+                <a:pos x="connsiteX8" y="connsiteY8"/>
+              </a:cxn>
+              <a:cxn ang="0">
+                <a:pos x="connsiteX9" y="connsiteY9"/>
+              </a:cxn>
+              <a:cxn ang="0">
+                <a:pos x="connsiteX10" y="connsiteY10"/>
+              </a:cxn>
+              <a:cxn ang="0">
+                <a:pos x="connsiteX11" y="connsiteY11"/>
+              </a:cxn>
+              <a:cxn ang="0">
+                <a:pos x="connsiteX12" y="connsiteY12"/>
+              </a:cxn>
+              <a:cxn ang="0">
+                <a:pos x="connsiteX13" y="connsiteY13"/>
+              </a:cxn>
+              <a:cxn ang="0">
+                <a:pos x="connsiteX14" y="connsiteY14"/>
+              </a:cxn>
+              <a:cxn ang="0">
+                <a:pos x="connsiteX15" y="connsiteY15"/>
+              </a:cxn>
+              <a:cxn ang="0">
+                <a:pos x="connsiteX16" y="connsiteY16"/>
+              </a:cxn>
+              <a:cxn ang="0">
+                <a:pos x="connsiteX17" y="connsiteY17"/>
+              </a:cxn>
+              <a:cxn ang="0">
+                <a:pos x="connsiteX18" y="connsiteY18"/>
+              </a:cxn>
+              <a:cxn ang="0">
+                <a:pos x="connsiteX19" y="connsiteY19"/>
+              </a:cxn>
+              <a:cxn ang="0">
+                <a:pos x="connsiteX20" y="connsiteY20"/>
+              </a:cxn>
+              <a:cxn ang="0">
+                <a:pos x="connsiteX21" y="connsiteY21"/>
+              </a:cxn>
+              <a:cxn ang="0">
+                <a:pos x="connsiteX22" y="connsiteY22"/>
+              </a:cxn>
+              <a:cxn ang="0">
+                <a:pos x="connsiteX23" y="connsiteY23"/>
+              </a:cxn>
+              <a:cxn ang="0">
+                <a:pos x="connsiteX24" y="connsiteY24"/>
+              </a:cxn>
+              <a:cxn ang="0">
+                <a:pos x="connsiteX25" y="connsiteY25"/>
+              </a:cxn>
+              <a:cxn ang="0">
+                <a:pos x="connsiteX26" y="connsiteY26"/>
+              </a:cxn>
+              <a:cxn ang="0">
+                <a:pos x="connsiteX27" y="connsiteY27"/>
+              </a:cxn>
+              <a:cxn ang="0">
+                <a:pos x="connsiteX28" y="connsiteY28"/>
+              </a:cxn>
+              <a:cxn ang="0">
+                <a:pos x="connsiteX29" y="connsiteY29"/>
+              </a:cxn>
+              <a:cxn ang="0">
+                <a:pos x="connsiteX30" y="connsiteY30"/>
+              </a:cxn>
+              <a:cxn ang="0">
+                <a:pos x="connsiteX31" y="connsiteY31"/>
+              </a:cxn>
+              <a:cxn ang="0">
+                <a:pos x="connsiteX32" y="connsiteY32"/>
+              </a:cxn>
+              <a:cxn ang="0">
+                <a:pos x="connsiteX33" y="connsiteY33"/>
+              </a:cxn>
+              <a:cxn ang="0">
+                <a:pos x="connsiteX34" y="connsiteY34"/>
+              </a:cxn>
+              <a:cxn ang="0">
+                <a:pos x="connsiteX35" y="connsiteY35"/>
+              </a:cxn>
+            </a:cxnLst>
+            <a:rect l="l" t="t" r="r" b="b"/>
+            <a:pathLst>
+              <a:path w="10853928" h="18288" fill="none" extrusionOk="0">
+                <a:moveTo>
+                  <a:pt x="0" y="0"/>
+                </a:moveTo>
+                <a:cubicBezTo>
+                  <a:pt x="146993" y="-19076"/>
+                  <a:pt x="347684" y="-4790"/>
+                  <a:pt x="461292" y="0"/>
+                </a:cubicBezTo>
+                <a:cubicBezTo>
+                  <a:pt x="574900" y="4790"/>
+                  <a:pt x="808367" y="19821"/>
+                  <a:pt x="1139662" y="0"/>
+                </a:cubicBezTo>
+                <a:cubicBezTo>
+                  <a:pt x="1470957" y="-19821"/>
+                  <a:pt x="1627405" y="5721"/>
+                  <a:pt x="1926572" y="0"/>
+                </a:cubicBezTo>
+                <a:cubicBezTo>
+                  <a:pt x="2225739" y="-5721"/>
+                  <a:pt x="2137730" y="-3235"/>
+                  <a:pt x="2279325" y="0"/>
+                </a:cubicBezTo>
+                <a:cubicBezTo>
+                  <a:pt x="2420920" y="3235"/>
+                  <a:pt x="2456518" y="9685"/>
+                  <a:pt x="2632078" y="0"/>
+                </a:cubicBezTo>
+                <a:cubicBezTo>
+                  <a:pt x="2807638" y="-9685"/>
+                  <a:pt x="3211516" y="-43007"/>
+                  <a:pt x="3527527" y="0"/>
+                </a:cubicBezTo>
+                <a:cubicBezTo>
+                  <a:pt x="3843538" y="43007"/>
+                  <a:pt x="4058833" y="22042"/>
+                  <a:pt x="4205897" y="0"/>
+                </a:cubicBezTo>
+                <a:cubicBezTo>
+                  <a:pt x="4352961" y="-22042"/>
+                  <a:pt x="4474805" y="-11846"/>
+                  <a:pt x="4558650" y="0"/>
+                </a:cubicBezTo>
+                <a:cubicBezTo>
+                  <a:pt x="4642495" y="11846"/>
+                  <a:pt x="5041928" y="-6069"/>
+                  <a:pt x="5237020" y="0"/>
+                </a:cubicBezTo>
+                <a:cubicBezTo>
+                  <a:pt x="5432112" y="6069"/>
+                  <a:pt x="5943266" y="-17479"/>
+                  <a:pt x="6132469" y="0"/>
+                </a:cubicBezTo>
+                <a:cubicBezTo>
+                  <a:pt x="6321672" y="17479"/>
+                  <a:pt x="6483872" y="26234"/>
+                  <a:pt x="6702301" y="0"/>
+                </a:cubicBezTo>
+                <a:cubicBezTo>
+                  <a:pt x="6920730" y="-26234"/>
+                  <a:pt x="6991194" y="-15156"/>
+                  <a:pt x="7272132" y="0"/>
+                </a:cubicBezTo>
+                <a:cubicBezTo>
+                  <a:pt x="7553070" y="15156"/>
+                  <a:pt x="7684444" y="-32961"/>
+                  <a:pt x="7950502" y="0"/>
+                </a:cubicBezTo>
+                <a:cubicBezTo>
+                  <a:pt x="8216560" y="32961"/>
+                  <a:pt x="8493290" y="-10491"/>
+                  <a:pt x="8737412" y="0"/>
+                </a:cubicBezTo>
+                <a:cubicBezTo>
+                  <a:pt x="8981534" y="10491"/>
+                  <a:pt x="9191586" y="-13899"/>
+                  <a:pt x="9524322" y="0"/>
+                </a:cubicBezTo>
+                <a:cubicBezTo>
+                  <a:pt x="9857058" y="13899"/>
+                  <a:pt x="10297509" y="7485"/>
+                  <a:pt x="10853928" y="0"/>
+                </a:cubicBezTo>
+                <a:cubicBezTo>
+                  <a:pt x="10854574" y="4451"/>
+                  <a:pt x="10854418" y="9226"/>
+                  <a:pt x="10853928" y="18288"/>
+                </a:cubicBezTo>
+                <a:cubicBezTo>
+                  <a:pt x="10691638" y="28522"/>
+                  <a:pt x="10574319" y="29578"/>
+                  <a:pt x="10392636" y="18288"/>
+                </a:cubicBezTo>
+                <a:cubicBezTo>
+                  <a:pt x="10210953" y="6998"/>
+                  <a:pt x="9836277" y="-16742"/>
+                  <a:pt x="9497187" y="18288"/>
+                </a:cubicBezTo>
+                <a:cubicBezTo>
+                  <a:pt x="9158097" y="53318"/>
+                  <a:pt x="9119479" y="30714"/>
+                  <a:pt x="8818817" y="18288"/>
+                </a:cubicBezTo>
+                <a:cubicBezTo>
+                  <a:pt x="8518155" y="5863"/>
+                  <a:pt x="8640037" y="6483"/>
+                  <a:pt x="8466064" y="18288"/>
+                </a:cubicBezTo>
+                <a:cubicBezTo>
+                  <a:pt x="8292091" y="30093"/>
+                  <a:pt x="7997656" y="18914"/>
+                  <a:pt x="7787693" y="18288"/>
+                </a:cubicBezTo>
+                <a:cubicBezTo>
+                  <a:pt x="7577730" y="17662"/>
+                  <a:pt x="7412468" y="21416"/>
+                  <a:pt x="7217862" y="18288"/>
+                </a:cubicBezTo>
+                <a:cubicBezTo>
+                  <a:pt x="7023256" y="15160"/>
+                  <a:pt x="6898018" y="14824"/>
+                  <a:pt x="6648031" y="18288"/>
+                </a:cubicBezTo>
+                <a:cubicBezTo>
+                  <a:pt x="6398044" y="21752"/>
+                  <a:pt x="6254402" y="38625"/>
+                  <a:pt x="6078200" y="18288"/>
+                </a:cubicBezTo>
+                <a:cubicBezTo>
+                  <a:pt x="5901998" y="-2049"/>
+                  <a:pt x="5622886" y="3213"/>
+                  <a:pt x="5508368" y="18288"/>
+                </a:cubicBezTo>
+                <a:cubicBezTo>
+                  <a:pt x="5393850" y="33363"/>
+                  <a:pt x="5036260" y="26830"/>
+                  <a:pt x="4721459" y="18288"/>
+                </a:cubicBezTo>
+                <a:cubicBezTo>
+                  <a:pt x="4406658" y="9746"/>
+                  <a:pt x="4239221" y="41551"/>
+                  <a:pt x="4043088" y="18288"/>
+                </a:cubicBezTo>
+                <a:cubicBezTo>
+                  <a:pt x="3846955" y="-4975"/>
+                  <a:pt x="3818802" y="34658"/>
+                  <a:pt x="3690336" y="18288"/>
+                </a:cubicBezTo>
+                <a:cubicBezTo>
+                  <a:pt x="3561870" y="1918"/>
+                  <a:pt x="3265491" y="42194"/>
+                  <a:pt x="3120504" y="18288"/>
+                </a:cubicBezTo>
+                <a:cubicBezTo>
+                  <a:pt x="2975517" y="-5618"/>
+                  <a:pt x="2720254" y="36673"/>
+                  <a:pt x="2333595" y="18288"/>
+                </a:cubicBezTo>
+                <a:cubicBezTo>
+                  <a:pt x="1946936" y="-97"/>
+                  <a:pt x="2097241" y="5776"/>
+                  <a:pt x="1872303" y="18288"/>
+                </a:cubicBezTo>
+                <a:cubicBezTo>
+                  <a:pt x="1647365" y="30800"/>
+                  <a:pt x="1282708" y="45380"/>
+                  <a:pt x="976854" y="18288"/>
+                </a:cubicBezTo>
+                <a:cubicBezTo>
+                  <a:pt x="671000" y="-8804"/>
+                  <a:pt x="408401" y="-12775"/>
+                  <a:pt x="0" y="18288"/>
+                </a:cubicBezTo>
+                <a:cubicBezTo>
+                  <a:pt x="-213" y="9468"/>
+                  <a:pt x="187" y="4459"/>
+                  <a:pt x="0" y="0"/>
+                </a:cubicBezTo>
+                <a:close/>
+              </a:path>
+              <a:path w="10853928" h="18288" stroke="0" extrusionOk="0">
+                <a:moveTo>
+                  <a:pt x="0" y="0"/>
+                </a:moveTo>
+                <a:cubicBezTo>
+                  <a:pt x="267322" y="15284"/>
+                  <a:pt x="415388" y="-21048"/>
+                  <a:pt x="569831" y="0"/>
+                </a:cubicBezTo>
+                <a:cubicBezTo>
+                  <a:pt x="724274" y="21048"/>
+                  <a:pt x="769333" y="-2353"/>
+                  <a:pt x="922584" y="0"/>
+                </a:cubicBezTo>
+                <a:cubicBezTo>
+                  <a:pt x="1075835" y="2353"/>
+                  <a:pt x="1399490" y="-145"/>
+                  <a:pt x="1818033" y="0"/>
+                </a:cubicBezTo>
+                <a:cubicBezTo>
+                  <a:pt x="2236576" y="145"/>
+                  <a:pt x="2145330" y="5482"/>
+                  <a:pt x="2387864" y="0"/>
+                </a:cubicBezTo>
+                <a:cubicBezTo>
+                  <a:pt x="2630398" y="-5482"/>
+                  <a:pt x="2793207" y="18487"/>
+                  <a:pt x="2957695" y="0"/>
+                </a:cubicBezTo>
+                <a:cubicBezTo>
+                  <a:pt x="3122183" y="-18487"/>
+                  <a:pt x="3579141" y="19003"/>
+                  <a:pt x="3853144" y="0"/>
+                </a:cubicBezTo>
+                <a:cubicBezTo>
+                  <a:pt x="4127147" y="-19003"/>
+                  <a:pt x="4209857" y="12211"/>
+                  <a:pt x="4314436" y="0"/>
+                </a:cubicBezTo>
+                <a:cubicBezTo>
+                  <a:pt x="4419015" y="-12211"/>
+                  <a:pt x="4762459" y="-17220"/>
+                  <a:pt x="5209885" y="0"/>
+                </a:cubicBezTo>
+                <a:cubicBezTo>
+                  <a:pt x="5657311" y="17220"/>
+                  <a:pt x="5692663" y="-3290"/>
+                  <a:pt x="6105335" y="0"/>
+                </a:cubicBezTo>
+                <a:cubicBezTo>
+                  <a:pt x="6518007" y="3290"/>
+                  <a:pt x="6455516" y="-5124"/>
+                  <a:pt x="6783705" y="0"/>
+                </a:cubicBezTo>
+                <a:cubicBezTo>
+                  <a:pt x="7111894" y="5124"/>
+                  <a:pt x="7441941" y="-17829"/>
+                  <a:pt x="7679154" y="0"/>
+                </a:cubicBezTo>
+                <a:cubicBezTo>
+                  <a:pt x="7916367" y="17829"/>
+                  <a:pt x="8102967" y="-24363"/>
+                  <a:pt x="8248985" y="0"/>
+                </a:cubicBezTo>
+                <a:cubicBezTo>
+                  <a:pt x="8395003" y="24363"/>
+                  <a:pt x="8552393" y="25505"/>
+                  <a:pt x="8818817" y="0"/>
+                </a:cubicBezTo>
+                <a:cubicBezTo>
+                  <a:pt x="9085241" y="-25505"/>
+                  <a:pt x="9411308" y="38000"/>
+                  <a:pt x="9605726" y="0"/>
+                </a:cubicBezTo>
+                <a:cubicBezTo>
+                  <a:pt x="9800144" y="-38000"/>
+                  <a:pt x="10006468" y="-25741"/>
+                  <a:pt x="10175558" y="0"/>
+                </a:cubicBezTo>
+                <a:cubicBezTo>
+                  <a:pt x="10344648" y="25741"/>
+                  <a:pt x="10696282" y="695"/>
+                  <a:pt x="10853928" y="0"/>
+                </a:cubicBezTo>
+                <a:cubicBezTo>
+                  <a:pt x="10853521" y="8690"/>
+                  <a:pt x="10853774" y="14141"/>
+                  <a:pt x="10853928" y="18288"/>
+                </a:cubicBezTo>
+                <a:cubicBezTo>
+                  <a:pt x="10608124" y="24255"/>
+                  <a:pt x="10343415" y="22307"/>
+                  <a:pt x="10067018" y="18288"/>
+                </a:cubicBezTo>
+                <a:cubicBezTo>
+                  <a:pt x="9790621" y="14270"/>
+                  <a:pt x="9843266" y="3564"/>
+                  <a:pt x="9714266" y="18288"/>
+                </a:cubicBezTo>
+                <a:cubicBezTo>
+                  <a:pt x="9585266" y="33012"/>
+                  <a:pt x="9379484" y="1875"/>
+                  <a:pt x="9252974" y="18288"/>
+                </a:cubicBezTo>
+                <a:cubicBezTo>
+                  <a:pt x="9126464" y="34701"/>
+                  <a:pt x="8580678" y="-4904"/>
+                  <a:pt x="8357525" y="18288"/>
+                </a:cubicBezTo>
+                <a:cubicBezTo>
+                  <a:pt x="8134372" y="41480"/>
+                  <a:pt x="7903199" y="26458"/>
+                  <a:pt x="7679154" y="18288"/>
+                </a:cubicBezTo>
+                <a:cubicBezTo>
+                  <a:pt x="7455109" y="10118"/>
+                  <a:pt x="7435944" y="27109"/>
+                  <a:pt x="7217862" y="18288"/>
+                </a:cubicBezTo>
+                <a:cubicBezTo>
+                  <a:pt x="6999780" y="9467"/>
+                  <a:pt x="6680409" y="18985"/>
+                  <a:pt x="6539492" y="18288"/>
+                </a:cubicBezTo>
+                <a:cubicBezTo>
+                  <a:pt x="6398575" y="17592"/>
+                  <a:pt x="6312077" y="33018"/>
+                  <a:pt x="6186739" y="18288"/>
+                </a:cubicBezTo>
+                <a:cubicBezTo>
+                  <a:pt x="6061401" y="3558"/>
+                  <a:pt x="5947033" y="12075"/>
+                  <a:pt x="5833986" y="18288"/>
+                </a:cubicBezTo>
+                <a:cubicBezTo>
+                  <a:pt x="5720939" y="24501"/>
+                  <a:pt x="5482226" y="8586"/>
+                  <a:pt x="5155616" y="18288"/>
+                </a:cubicBezTo>
+                <a:cubicBezTo>
+                  <a:pt x="4829006" y="27991"/>
+                  <a:pt x="4841274" y="29316"/>
+                  <a:pt x="4694324" y="18288"/>
+                </a:cubicBezTo>
+                <a:cubicBezTo>
+                  <a:pt x="4547374" y="7260"/>
+                  <a:pt x="4077675" y="7013"/>
+                  <a:pt x="3907414" y="18288"/>
+                </a:cubicBezTo>
+                <a:cubicBezTo>
+                  <a:pt x="3737153" y="29564"/>
+                  <a:pt x="3538393" y="21630"/>
+                  <a:pt x="3446122" y="18288"/>
+                </a:cubicBezTo>
+                <a:cubicBezTo>
+                  <a:pt x="3353851" y="14946"/>
+                  <a:pt x="2990320" y="-8091"/>
+                  <a:pt x="2659212" y="18288"/>
+                </a:cubicBezTo>
+                <a:cubicBezTo>
+                  <a:pt x="2328104" y="44667"/>
+                  <a:pt x="2427653" y="9607"/>
+                  <a:pt x="2306460" y="18288"/>
+                </a:cubicBezTo>
+                <a:cubicBezTo>
+                  <a:pt x="2185267" y="26969"/>
+                  <a:pt x="1719763" y="3717"/>
+                  <a:pt x="1519550" y="18288"/>
+                </a:cubicBezTo>
+                <a:cubicBezTo>
+                  <a:pt x="1319337" y="32860"/>
+                  <a:pt x="1167371" y="17040"/>
+                  <a:pt x="1058258" y="18288"/>
+                </a:cubicBezTo>
+                <a:cubicBezTo>
+                  <a:pt x="949145" y="19536"/>
+                  <a:pt x="780234" y="31447"/>
+                  <a:pt x="705505" y="18288"/>
+                </a:cubicBezTo>
+                <a:cubicBezTo>
+                  <a:pt x="630776" y="5129"/>
+                  <a:pt x="215796" y="30056"/>
+                  <a:pt x="0" y="18288"/>
+                </a:cubicBezTo>
+                <a:cubicBezTo>
+                  <a:pt x="-53" y="11301"/>
+                  <a:pt x="-649" y="7756"/>
+                  <a:pt x="0" y="0"/>
+                </a:cubicBezTo>
+                <a:close/>
+              </a:path>
+            </a:pathLst>
+          </a:custGeom>
+          <a:solidFill>
+            <a:schemeClr val="accent2"/>
+          </a:solidFill>
+          <a:ln w="41275" cap="rnd">
+            <a:solidFill>
+              <a:schemeClr val="accent2"/>
+            </a:solidFill>
+            <a:round/>
+            <a:extLst>
+              <a:ext uri="{C807C97D-BFC1-408E-A445-0C87EB9F89A2}">
+                <ask:lineSketchStyleProps xmlns:ask="http://schemas.microsoft.com/office/drawing/2018/sketchyshapes" sd="1219033472">
+                  <a:prstGeom prst="rect">
+                    <a:avLst/>
+                  </a:prstGeom>
+                  <ask:type>
+                    <ask:lineSketchFreehand/>
+                  </ask:type>
+                </ask:lineSketchStyleProps>
+              </a:ext>
+            </a:extLst>
+          </a:ln>
+        </p:spPr>
+        <p:style>
+          <a:lnRef idx="2">
+            <a:schemeClr val="accent1">
+              <a:shade val="50000"/>
+            </a:schemeClr>
+          </a:lnRef>
+          <a:fillRef idx="1">
+            <a:schemeClr val="accent1"/>
+          </a:fillRef>
+          <a:effectRef idx="0">
+            <a:schemeClr val="accent1"/>
+          </a:effectRef>
+          <a:fontRef idx="minor">
+            <a:schemeClr val="lt1"/>
+          </a:fontRef>
+        </p:style>
+        <p:txBody>
+          <a:bodyPr rtlCol="0" anchor="ctr"/>
+          <a:lstStyle/>
+          <a:p>
+            <a:pPr algn="ctr"/>
+            <a:endParaRPr lang="en-US"/>
+          </a:p>
+        </p:txBody>
+      </p:sp>
+      <p:sp>
+        <p:nvSpPr>
+          <p:cNvPr id="9" name="Content Placeholder 2">
+            <a:extLst>
+              <a:ext uri="{FF2B5EF4-FFF2-40B4-BE49-F238E27FC236}">
+                <a16:creationId xmlns:a16="http://schemas.microsoft.com/office/drawing/2014/main" id="{E7DC8D99-7888-C565-EECC-448402BC75B1}"/>
+              </a:ext>
+            </a:extLst>
+          </p:cNvPr>
+          <p:cNvSpPr>
+            <a:spLocks noGrp="1"/>
+          </p:cNvSpPr>
+          <p:nvPr>
+            <p:ph idx="1"/>
+          </p:nvPr>
+        </p:nvSpPr>
+        <p:spPr>
+          <a:xfrm>
+            <a:off x="838200" y="1929384"/>
+            <a:ext cx="10515600" cy="4251960"/>
+          </a:xfrm>
+        </p:spPr>
+        <p:txBody>
+          <a:bodyPr>
+            <a:normAutofit/>
+          </a:bodyPr>
+          <a:lstStyle/>
           <a:p>
             <a:pPr marL="0" indent="0">
               <a:buNone/>
             </a:pPr>
             <a:r>
-              <a:rPr lang="en-US" sz="2200" dirty="0"/>
+              <a:rPr lang="en-US" sz="1800" b="1" dirty="0"/>
+              <a:t>Recession resistance</a:t>
+            </a:r>
+            <a:r>
+              <a:rPr lang="en-US" sz="1800" dirty="0"/>
+              <a:t>: upper outliers that grew the most during recession years</a:t>
+            </a:r>
+          </a:p>
+          <a:p>
+            <a:pPr marL="0" indent="0">
+              <a:buNone/>
+            </a:pPr>
+            <a:r>
+              <a:rPr lang="en-US" sz="1800" b="1" dirty="0"/>
+              <a:t>Declining spaces</a:t>
+            </a:r>
+            <a:r>
+              <a:rPr lang="en-US" sz="1800" dirty="0"/>
+              <a:t>: lower outliers that lost the most during non-recession years</a:t>
+            </a:r>
+          </a:p>
+          <a:p>
+            <a:pPr marL="0" indent="0">
+              <a:buNone/>
+            </a:pPr>
+            <a:r>
+              <a:rPr lang="en-US" sz="1800" dirty="0"/>
               <a:t>Our data did not have values for all years; the growth side outliers are less meaningful</a:t>
             </a:r>
           </a:p>
@@ -7768,6 +8733,7 @@
           <a:prstGeom prst="leftBrace">
             <a:avLst/>
           </a:prstGeom>
+          <a:ln w="19050"/>
         </p:spPr>
         <p:style>
           <a:lnRef idx="1">
@@ -7806,8 +8772,8 @@
         </p:nvSpPr>
         <p:spPr>
           <a:xfrm>
-            <a:off x="9299144" y="5078246"/>
-            <a:ext cx="2223820" cy="415498"/>
+            <a:off x="9046464" y="5078246"/>
+            <a:ext cx="2111271" cy="415498"/>
           </a:xfrm>
           <a:prstGeom prst="rect">
             <a:avLst/>
@@ -7820,9 +8786,10 @@
           </a:bodyPr>
           <a:lstStyle/>
           <a:p>
+            <a:pPr algn="ctr"/>
             <a:r>
               <a:rPr lang="en-US" sz="1050" dirty="0"/>
-              <a:t>Note: Missing years may limit usefulness of the data</a:t>
+              <a:t>Missing years may limit usefulness of the data</a:t>
             </a:r>
           </a:p>
         </p:txBody>
@@ -8946,7 +9913,7 @@
                     <a:p>
                       <a:pPr algn="ctr" fontAlgn="b"/>
                       <a:r>
-                        <a:rPr lang="en-US" sz="800" b="0" i="0" u="none" strike="noStrike">
+                        <a:rPr lang="en-US" sz="800" b="0" i="0" u="none" strike="noStrike" dirty="0">
                           <a:solidFill>
                             <a:srgbClr val="000000"/>
                           </a:solidFill>
@@ -9048,6 +10015,54 @@
           </a:graphicData>
         </a:graphic>
       </p:graphicFrame>
+      <p:sp>
+        <p:nvSpPr>
+          <p:cNvPr id="4" name="Rectangle 3">
+            <a:extLst>
+              <a:ext uri="{FF2B5EF4-FFF2-40B4-BE49-F238E27FC236}">
+                <a16:creationId xmlns:a16="http://schemas.microsoft.com/office/drawing/2014/main" id="{F96F5672-19E2-EEFF-CC76-F724A7C683B4}"/>
+              </a:ext>
+            </a:extLst>
+          </p:cNvPr>
+          <p:cNvSpPr/>
+          <p:nvPr/>
+        </p:nvSpPr>
+        <p:spPr>
+          <a:xfrm>
+            <a:off x="5435029" y="4171308"/>
+            <a:ext cx="3359650" cy="215757"/>
+          </a:xfrm>
+          <a:prstGeom prst="rect">
+            <a:avLst/>
+          </a:prstGeom>
+          <a:noFill/>
+          <a:ln w="19050"/>
+        </p:spPr>
+        <p:style>
+          <a:lnRef idx="2">
+            <a:schemeClr val="accent1">
+              <a:shade val="50000"/>
+            </a:schemeClr>
+          </a:lnRef>
+          <a:fillRef idx="1">
+            <a:schemeClr val="accent1"/>
+          </a:fillRef>
+          <a:effectRef idx="0">
+            <a:schemeClr val="accent1"/>
+          </a:effectRef>
+          <a:fontRef idx="minor">
+            <a:schemeClr val="lt1"/>
+          </a:fontRef>
+        </p:style>
+        <p:txBody>
+          <a:bodyPr rtlCol="0" anchor="ctr"/>
+          <a:lstStyle/>
+          <a:p>
+            <a:pPr algn="ctr"/>
+            <a:endParaRPr lang="en-US"/>
+          </a:p>
+        </p:txBody>
+      </p:sp>
     </p:spTree>
     <p:extLst>
       <p:ext uri="{BB962C8B-B14F-4D97-AF65-F5344CB8AC3E}">
@@ -9061,7 +10076,7 @@
 </p:sld>
 </file>
 
-<file path=ppt/slides/slide11.xml><?xml version="1.0" encoding="utf-8"?>
+<file path=ppt/slides/slide12.xml><?xml version="1.0" encoding="utf-8"?>
 <p:sld xmlns:a="http://schemas.openxmlformats.org/drawingml/2006/main" xmlns:r="http://schemas.openxmlformats.org/officeDocument/2006/relationships" xmlns:p="http://schemas.openxmlformats.org/presentationml/2006/main">
   <p:cSld>
     <p:bg>
@@ -11673,8 +12688,8 @@
           <a:lstStyle/>
           <a:p>
             <a:r>
-              <a:rPr lang="en-US" sz="5400" dirty="0"/>
-              <a:t>Analytics: 1</a:t>
+              <a:rPr lang="en-US" sz="3600" dirty="0"/>
+              <a:t>Findings</a:t>
             </a:r>
           </a:p>
         </p:txBody>
@@ -12356,6 +13371,863 @@
                   </a:schemeClr>
                 </a:solidFill>
               </a:rPr>
+              <a:t>Key Findings:</a:t>
+            </a:r>
+          </a:p>
+          <a:p>
+            <a:r>
+              <a:rPr lang="en-US" sz="2200" dirty="0" err="1"/>
+              <a:t>xyz</a:t>
+            </a:r>
+            <a:endParaRPr lang="en-US" sz="2200" dirty="0"/>
+          </a:p>
+          <a:p>
+            <a:pPr marL="0" indent="0">
+              <a:buNone/>
+            </a:pPr>
+            <a:r>
+              <a:rPr lang="en-US" sz="2200" b="1" dirty="0">
+                <a:solidFill>
+                  <a:schemeClr val="accent5">
+                    <a:lumMod val="50000"/>
+                  </a:schemeClr>
+                </a:solidFill>
+              </a:rPr>
+              <a:t>Selected Areas of Interest:</a:t>
+            </a:r>
+          </a:p>
+          <a:p>
+            <a:r>
+              <a:rPr lang="en-US" sz="2200" dirty="0" err="1"/>
+              <a:t>Abc</a:t>
+            </a:r>
+            <a:endParaRPr lang="en-US" sz="2200" dirty="0"/>
+          </a:p>
+          <a:p>
+            <a:r>
+              <a:rPr lang="en-US" sz="2200" dirty="0"/>
+              <a:t>Def</a:t>
+            </a:r>
+          </a:p>
+          <a:p>
+            <a:r>
+              <a:rPr lang="en-US" sz="2200" dirty="0" err="1"/>
+              <a:t>ghi</a:t>
+            </a:r>
+            <a:endParaRPr lang="en-US" sz="2200" dirty="0"/>
+          </a:p>
+        </p:txBody>
+      </p:sp>
+    </p:spTree>
+    <p:extLst>
+      <p:ext uri="{BB962C8B-B14F-4D97-AF65-F5344CB8AC3E}">
+        <p14:creationId xmlns:p14="http://schemas.microsoft.com/office/powerpoint/2010/main" val="2679768337"/>
+      </p:ext>
+    </p:extLst>
+  </p:cSld>
+  <p:clrMapOvr>
+    <a:masterClrMapping/>
+  </p:clrMapOvr>
+</p:sld>
+</file>
+
+<file path=ppt/slides/slide4.xml><?xml version="1.0" encoding="utf-8"?>
+<p:sld xmlns:a="http://schemas.openxmlformats.org/drawingml/2006/main" xmlns:r="http://schemas.openxmlformats.org/officeDocument/2006/relationships" xmlns:p="http://schemas.openxmlformats.org/presentationml/2006/main">
+  <p:cSld>
+    <p:bg>
+      <p:bgPr>
+        <a:solidFill>
+          <a:schemeClr val="bg1"/>
+        </a:solidFill>
+        <a:effectLst/>
+      </p:bgPr>
+    </p:bg>
+    <p:spTree>
+      <p:nvGrpSpPr>
+        <p:cNvPr id="1" name=""/>
+        <p:cNvGrpSpPr/>
+        <p:nvPr/>
+      </p:nvGrpSpPr>
+      <p:grpSpPr>
+        <a:xfrm>
+          <a:off x="0" y="0"/>
+          <a:ext cx="0" cy="0"/>
+          <a:chOff x="0" y="0"/>
+          <a:chExt cx="0" cy="0"/>
+        </a:xfrm>
+      </p:grpSpPr>
+      <p:sp useBgFill="1">
+        <p:nvSpPr>
+          <p:cNvPr id="19" name="Rectangle 18">
+            <a:extLst>
+              <a:ext uri="{FF2B5EF4-FFF2-40B4-BE49-F238E27FC236}">
+                <a16:creationId xmlns:a16="http://schemas.microsoft.com/office/drawing/2014/main" id="{100EDD19-6802-4EC3-95CE-CFFAB042CFD6}"/>
+              </a:ext>
+              <a:ext uri="{C183D7F6-B498-43B3-948B-1728B52AA6E4}">
+                <adec:decorative xmlns:adec="http://schemas.microsoft.com/office/drawing/2017/decorative" val="1"/>
+              </a:ext>
+            </a:extLst>
+          </p:cNvPr>
+          <p:cNvSpPr>
+            <a:spLocks noGrp="1" noRot="1" noChangeAspect="1" noMove="1" noResize="1" noEditPoints="1" noAdjustHandles="1" noChangeArrowheads="1" noChangeShapeType="1" noTextEdit="1"/>
+          </p:cNvSpPr>
+          <p:nvPr>
+            <p:extLst>
+              <p:ext uri="{386F3935-93C4-4BCD-93E2-E3B085C9AB24}">
+                <p16:designElem xmlns:p16="http://schemas.microsoft.com/office/powerpoint/2015/main" val="1"/>
+              </p:ext>
+            </p:extLst>
+          </p:nvPr>
+        </p:nvSpPr>
+        <p:spPr>
+          <a:xfrm>
+            <a:off x="0" y="0"/>
+            <a:ext cx="12188952" cy="6858000"/>
+          </a:xfrm>
+          <a:prstGeom prst="rect">
+            <a:avLst/>
+          </a:prstGeom>
+          <a:ln>
+            <a:noFill/>
+          </a:ln>
+        </p:spPr>
+        <p:style>
+          <a:lnRef idx="2">
+            <a:schemeClr val="accent1">
+              <a:shade val="50000"/>
+            </a:schemeClr>
+          </a:lnRef>
+          <a:fillRef idx="1">
+            <a:schemeClr val="accent1"/>
+          </a:fillRef>
+          <a:effectRef idx="0">
+            <a:schemeClr val="accent1"/>
+          </a:effectRef>
+          <a:fontRef idx="minor">
+            <a:schemeClr val="lt1"/>
+          </a:fontRef>
+        </p:style>
+        <p:txBody>
+          <a:bodyPr rtlCol="0" anchor="ctr"/>
+          <a:lstStyle/>
+          <a:p>
+            <a:pPr algn="ctr"/>
+            <a:endParaRPr lang="en-US"/>
+          </a:p>
+        </p:txBody>
+      </p:sp>
+      <p:sp>
+        <p:nvSpPr>
+          <p:cNvPr id="4" name="Title 3">
+            <a:extLst>
+              <a:ext uri="{FF2B5EF4-FFF2-40B4-BE49-F238E27FC236}">
+                <a16:creationId xmlns:a16="http://schemas.microsoft.com/office/drawing/2014/main" id="{9F7A142E-2D28-D2DB-7C4C-A0994DEE6DE5}"/>
+              </a:ext>
+            </a:extLst>
+          </p:cNvPr>
+          <p:cNvSpPr>
+            <a:spLocks noGrp="1"/>
+          </p:cNvSpPr>
+          <p:nvPr>
+            <p:ph type="title"/>
+          </p:nvPr>
+        </p:nvSpPr>
+        <p:spPr>
+          <a:xfrm>
+            <a:off x="838200" y="365125"/>
+            <a:ext cx="10515600" cy="1325563"/>
+          </a:xfrm>
+        </p:spPr>
+        <p:txBody>
+          <a:bodyPr>
+            <a:normAutofit/>
+          </a:bodyPr>
+          <a:lstStyle/>
+          <a:p>
+            <a:r>
+              <a:rPr lang="en-US" sz="5400" dirty="0"/>
+              <a:t>Analytics: 1</a:t>
+            </a:r>
+          </a:p>
+        </p:txBody>
+      </p:sp>
+      <p:sp>
+        <p:nvSpPr>
+          <p:cNvPr id="21" name="sketch line">
+            <a:extLst>
+              <a:ext uri="{FF2B5EF4-FFF2-40B4-BE49-F238E27FC236}">
+                <a16:creationId xmlns:a16="http://schemas.microsoft.com/office/drawing/2014/main" id="{DB17E863-922E-4C26-BD64-E8FD41D28661}"/>
+              </a:ext>
+              <a:ext uri="{C183D7F6-B498-43B3-948B-1728B52AA6E4}">
+                <adec:decorative xmlns:adec="http://schemas.microsoft.com/office/drawing/2017/decorative" val="1"/>
+              </a:ext>
+            </a:extLst>
+          </p:cNvPr>
+          <p:cNvSpPr>
+            <a:spLocks noGrp="1" noRot="1" noChangeAspect="1" noMove="1" noResize="1" noEditPoints="1" noAdjustHandles="1" noChangeArrowheads="1" noChangeShapeType="1" noTextEdit="1"/>
+          </p:cNvSpPr>
+          <p:nvPr>
+            <p:extLst>
+              <p:ext uri="{386F3935-93C4-4BCD-93E2-E3B085C9AB24}">
+                <p16:designElem xmlns:p16="http://schemas.microsoft.com/office/powerpoint/2015/main" val="1"/>
+              </p:ext>
+            </p:extLst>
+          </p:nvPr>
+        </p:nvSpPr>
+        <p:spPr>
+          <a:xfrm>
+            <a:off x="669036" y="1677373"/>
+            <a:ext cx="10853928" cy="18288"/>
+          </a:xfrm>
+          <a:custGeom>
+            <a:avLst/>
+            <a:gdLst>
+              <a:gd name="connsiteX0" fmla="*/ 0 w 10853928"/>
+              <a:gd name="connsiteY0" fmla="*/ 0 h 18288"/>
+              <a:gd name="connsiteX1" fmla="*/ 461292 w 10853928"/>
+              <a:gd name="connsiteY1" fmla="*/ 0 h 18288"/>
+              <a:gd name="connsiteX2" fmla="*/ 1139662 w 10853928"/>
+              <a:gd name="connsiteY2" fmla="*/ 0 h 18288"/>
+              <a:gd name="connsiteX3" fmla="*/ 1926572 w 10853928"/>
+              <a:gd name="connsiteY3" fmla="*/ 0 h 18288"/>
+              <a:gd name="connsiteX4" fmla="*/ 2279325 w 10853928"/>
+              <a:gd name="connsiteY4" fmla="*/ 0 h 18288"/>
+              <a:gd name="connsiteX5" fmla="*/ 2632078 w 10853928"/>
+              <a:gd name="connsiteY5" fmla="*/ 0 h 18288"/>
+              <a:gd name="connsiteX6" fmla="*/ 3527527 w 10853928"/>
+              <a:gd name="connsiteY6" fmla="*/ 0 h 18288"/>
+              <a:gd name="connsiteX7" fmla="*/ 4205897 w 10853928"/>
+              <a:gd name="connsiteY7" fmla="*/ 0 h 18288"/>
+              <a:gd name="connsiteX8" fmla="*/ 4558650 w 10853928"/>
+              <a:gd name="connsiteY8" fmla="*/ 0 h 18288"/>
+              <a:gd name="connsiteX9" fmla="*/ 5237020 w 10853928"/>
+              <a:gd name="connsiteY9" fmla="*/ 0 h 18288"/>
+              <a:gd name="connsiteX10" fmla="*/ 6132469 w 10853928"/>
+              <a:gd name="connsiteY10" fmla="*/ 0 h 18288"/>
+              <a:gd name="connsiteX11" fmla="*/ 6702301 w 10853928"/>
+              <a:gd name="connsiteY11" fmla="*/ 0 h 18288"/>
+              <a:gd name="connsiteX12" fmla="*/ 7272132 w 10853928"/>
+              <a:gd name="connsiteY12" fmla="*/ 0 h 18288"/>
+              <a:gd name="connsiteX13" fmla="*/ 7950502 w 10853928"/>
+              <a:gd name="connsiteY13" fmla="*/ 0 h 18288"/>
+              <a:gd name="connsiteX14" fmla="*/ 8737412 w 10853928"/>
+              <a:gd name="connsiteY14" fmla="*/ 0 h 18288"/>
+              <a:gd name="connsiteX15" fmla="*/ 9524322 w 10853928"/>
+              <a:gd name="connsiteY15" fmla="*/ 0 h 18288"/>
+              <a:gd name="connsiteX16" fmla="*/ 10853928 w 10853928"/>
+              <a:gd name="connsiteY16" fmla="*/ 0 h 18288"/>
+              <a:gd name="connsiteX17" fmla="*/ 10853928 w 10853928"/>
+              <a:gd name="connsiteY17" fmla="*/ 18288 h 18288"/>
+              <a:gd name="connsiteX18" fmla="*/ 10392636 w 10853928"/>
+              <a:gd name="connsiteY18" fmla="*/ 18288 h 18288"/>
+              <a:gd name="connsiteX19" fmla="*/ 9497187 w 10853928"/>
+              <a:gd name="connsiteY19" fmla="*/ 18288 h 18288"/>
+              <a:gd name="connsiteX20" fmla="*/ 8818817 w 10853928"/>
+              <a:gd name="connsiteY20" fmla="*/ 18288 h 18288"/>
+              <a:gd name="connsiteX21" fmla="*/ 8466064 w 10853928"/>
+              <a:gd name="connsiteY21" fmla="*/ 18288 h 18288"/>
+              <a:gd name="connsiteX22" fmla="*/ 7787693 w 10853928"/>
+              <a:gd name="connsiteY22" fmla="*/ 18288 h 18288"/>
+              <a:gd name="connsiteX23" fmla="*/ 7217862 w 10853928"/>
+              <a:gd name="connsiteY23" fmla="*/ 18288 h 18288"/>
+              <a:gd name="connsiteX24" fmla="*/ 6648031 w 10853928"/>
+              <a:gd name="connsiteY24" fmla="*/ 18288 h 18288"/>
+              <a:gd name="connsiteX25" fmla="*/ 6078200 w 10853928"/>
+              <a:gd name="connsiteY25" fmla="*/ 18288 h 18288"/>
+              <a:gd name="connsiteX26" fmla="*/ 5508368 w 10853928"/>
+              <a:gd name="connsiteY26" fmla="*/ 18288 h 18288"/>
+              <a:gd name="connsiteX27" fmla="*/ 4721459 w 10853928"/>
+              <a:gd name="connsiteY27" fmla="*/ 18288 h 18288"/>
+              <a:gd name="connsiteX28" fmla="*/ 4043088 w 10853928"/>
+              <a:gd name="connsiteY28" fmla="*/ 18288 h 18288"/>
+              <a:gd name="connsiteX29" fmla="*/ 3690336 w 10853928"/>
+              <a:gd name="connsiteY29" fmla="*/ 18288 h 18288"/>
+              <a:gd name="connsiteX30" fmla="*/ 3120504 w 10853928"/>
+              <a:gd name="connsiteY30" fmla="*/ 18288 h 18288"/>
+              <a:gd name="connsiteX31" fmla="*/ 2333595 w 10853928"/>
+              <a:gd name="connsiteY31" fmla="*/ 18288 h 18288"/>
+              <a:gd name="connsiteX32" fmla="*/ 1872303 w 10853928"/>
+              <a:gd name="connsiteY32" fmla="*/ 18288 h 18288"/>
+              <a:gd name="connsiteX33" fmla="*/ 976854 w 10853928"/>
+              <a:gd name="connsiteY33" fmla="*/ 18288 h 18288"/>
+              <a:gd name="connsiteX34" fmla="*/ 0 w 10853928"/>
+              <a:gd name="connsiteY34" fmla="*/ 18288 h 18288"/>
+              <a:gd name="connsiteX35" fmla="*/ 0 w 10853928"/>
+              <a:gd name="connsiteY35" fmla="*/ 0 h 18288"/>
+            </a:gdLst>
+            <a:ahLst/>
+            <a:cxnLst>
+              <a:cxn ang="0">
+                <a:pos x="connsiteX0" y="connsiteY0"/>
+              </a:cxn>
+              <a:cxn ang="0">
+                <a:pos x="connsiteX1" y="connsiteY1"/>
+              </a:cxn>
+              <a:cxn ang="0">
+                <a:pos x="connsiteX2" y="connsiteY2"/>
+              </a:cxn>
+              <a:cxn ang="0">
+                <a:pos x="connsiteX3" y="connsiteY3"/>
+              </a:cxn>
+              <a:cxn ang="0">
+                <a:pos x="connsiteX4" y="connsiteY4"/>
+              </a:cxn>
+              <a:cxn ang="0">
+                <a:pos x="connsiteX5" y="connsiteY5"/>
+              </a:cxn>
+              <a:cxn ang="0">
+                <a:pos x="connsiteX6" y="connsiteY6"/>
+              </a:cxn>
+              <a:cxn ang="0">
+                <a:pos x="connsiteX7" y="connsiteY7"/>
+              </a:cxn>
+              <a:cxn ang="0">
+                <a:pos x="connsiteX8" y="connsiteY8"/>
+              </a:cxn>
+              <a:cxn ang="0">
+                <a:pos x="connsiteX9" y="connsiteY9"/>
+              </a:cxn>
+              <a:cxn ang="0">
+                <a:pos x="connsiteX10" y="connsiteY10"/>
+              </a:cxn>
+              <a:cxn ang="0">
+                <a:pos x="connsiteX11" y="connsiteY11"/>
+              </a:cxn>
+              <a:cxn ang="0">
+                <a:pos x="connsiteX12" y="connsiteY12"/>
+              </a:cxn>
+              <a:cxn ang="0">
+                <a:pos x="connsiteX13" y="connsiteY13"/>
+              </a:cxn>
+              <a:cxn ang="0">
+                <a:pos x="connsiteX14" y="connsiteY14"/>
+              </a:cxn>
+              <a:cxn ang="0">
+                <a:pos x="connsiteX15" y="connsiteY15"/>
+              </a:cxn>
+              <a:cxn ang="0">
+                <a:pos x="connsiteX16" y="connsiteY16"/>
+              </a:cxn>
+              <a:cxn ang="0">
+                <a:pos x="connsiteX17" y="connsiteY17"/>
+              </a:cxn>
+              <a:cxn ang="0">
+                <a:pos x="connsiteX18" y="connsiteY18"/>
+              </a:cxn>
+              <a:cxn ang="0">
+                <a:pos x="connsiteX19" y="connsiteY19"/>
+              </a:cxn>
+              <a:cxn ang="0">
+                <a:pos x="connsiteX20" y="connsiteY20"/>
+              </a:cxn>
+              <a:cxn ang="0">
+                <a:pos x="connsiteX21" y="connsiteY21"/>
+              </a:cxn>
+              <a:cxn ang="0">
+                <a:pos x="connsiteX22" y="connsiteY22"/>
+              </a:cxn>
+              <a:cxn ang="0">
+                <a:pos x="connsiteX23" y="connsiteY23"/>
+              </a:cxn>
+              <a:cxn ang="0">
+                <a:pos x="connsiteX24" y="connsiteY24"/>
+              </a:cxn>
+              <a:cxn ang="0">
+                <a:pos x="connsiteX25" y="connsiteY25"/>
+              </a:cxn>
+              <a:cxn ang="0">
+                <a:pos x="connsiteX26" y="connsiteY26"/>
+              </a:cxn>
+              <a:cxn ang="0">
+                <a:pos x="connsiteX27" y="connsiteY27"/>
+              </a:cxn>
+              <a:cxn ang="0">
+                <a:pos x="connsiteX28" y="connsiteY28"/>
+              </a:cxn>
+              <a:cxn ang="0">
+                <a:pos x="connsiteX29" y="connsiteY29"/>
+              </a:cxn>
+              <a:cxn ang="0">
+                <a:pos x="connsiteX30" y="connsiteY30"/>
+              </a:cxn>
+              <a:cxn ang="0">
+                <a:pos x="connsiteX31" y="connsiteY31"/>
+              </a:cxn>
+              <a:cxn ang="0">
+                <a:pos x="connsiteX32" y="connsiteY32"/>
+              </a:cxn>
+              <a:cxn ang="0">
+                <a:pos x="connsiteX33" y="connsiteY33"/>
+              </a:cxn>
+              <a:cxn ang="0">
+                <a:pos x="connsiteX34" y="connsiteY34"/>
+              </a:cxn>
+              <a:cxn ang="0">
+                <a:pos x="connsiteX35" y="connsiteY35"/>
+              </a:cxn>
+            </a:cxnLst>
+            <a:rect l="l" t="t" r="r" b="b"/>
+            <a:pathLst>
+              <a:path w="10853928" h="18288" fill="none" extrusionOk="0">
+                <a:moveTo>
+                  <a:pt x="0" y="0"/>
+                </a:moveTo>
+                <a:cubicBezTo>
+                  <a:pt x="146993" y="-19076"/>
+                  <a:pt x="347684" y="-4790"/>
+                  <a:pt x="461292" y="0"/>
+                </a:cubicBezTo>
+                <a:cubicBezTo>
+                  <a:pt x="574900" y="4790"/>
+                  <a:pt x="808367" y="19821"/>
+                  <a:pt x="1139662" y="0"/>
+                </a:cubicBezTo>
+                <a:cubicBezTo>
+                  <a:pt x="1470957" y="-19821"/>
+                  <a:pt x="1627405" y="5721"/>
+                  <a:pt x="1926572" y="0"/>
+                </a:cubicBezTo>
+                <a:cubicBezTo>
+                  <a:pt x="2225739" y="-5721"/>
+                  <a:pt x="2137730" y="-3235"/>
+                  <a:pt x="2279325" y="0"/>
+                </a:cubicBezTo>
+                <a:cubicBezTo>
+                  <a:pt x="2420920" y="3235"/>
+                  <a:pt x="2456518" y="9685"/>
+                  <a:pt x="2632078" y="0"/>
+                </a:cubicBezTo>
+                <a:cubicBezTo>
+                  <a:pt x="2807638" y="-9685"/>
+                  <a:pt x="3211516" y="-43007"/>
+                  <a:pt x="3527527" y="0"/>
+                </a:cubicBezTo>
+                <a:cubicBezTo>
+                  <a:pt x="3843538" y="43007"/>
+                  <a:pt x="4058833" y="22042"/>
+                  <a:pt x="4205897" y="0"/>
+                </a:cubicBezTo>
+                <a:cubicBezTo>
+                  <a:pt x="4352961" y="-22042"/>
+                  <a:pt x="4474805" y="-11846"/>
+                  <a:pt x="4558650" y="0"/>
+                </a:cubicBezTo>
+                <a:cubicBezTo>
+                  <a:pt x="4642495" y="11846"/>
+                  <a:pt x="5041928" y="-6069"/>
+                  <a:pt x="5237020" y="0"/>
+                </a:cubicBezTo>
+                <a:cubicBezTo>
+                  <a:pt x="5432112" y="6069"/>
+                  <a:pt x="5943266" y="-17479"/>
+                  <a:pt x="6132469" y="0"/>
+                </a:cubicBezTo>
+                <a:cubicBezTo>
+                  <a:pt x="6321672" y="17479"/>
+                  <a:pt x="6483872" y="26234"/>
+                  <a:pt x="6702301" y="0"/>
+                </a:cubicBezTo>
+                <a:cubicBezTo>
+                  <a:pt x="6920730" y="-26234"/>
+                  <a:pt x="6991194" y="-15156"/>
+                  <a:pt x="7272132" y="0"/>
+                </a:cubicBezTo>
+                <a:cubicBezTo>
+                  <a:pt x="7553070" y="15156"/>
+                  <a:pt x="7684444" y="-32961"/>
+                  <a:pt x="7950502" y="0"/>
+                </a:cubicBezTo>
+                <a:cubicBezTo>
+                  <a:pt x="8216560" y="32961"/>
+                  <a:pt x="8493290" y="-10491"/>
+                  <a:pt x="8737412" y="0"/>
+                </a:cubicBezTo>
+                <a:cubicBezTo>
+                  <a:pt x="8981534" y="10491"/>
+                  <a:pt x="9191586" y="-13899"/>
+                  <a:pt x="9524322" y="0"/>
+                </a:cubicBezTo>
+                <a:cubicBezTo>
+                  <a:pt x="9857058" y="13899"/>
+                  <a:pt x="10297509" y="7485"/>
+                  <a:pt x="10853928" y="0"/>
+                </a:cubicBezTo>
+                <a:cubicBezTo>
+                  <a:pt x="10854574" y="4451"/>
+                  <a:pt x="10854418" y="9226"/>
+                  <a:pt x="10853928" y="18288"/>
+                </a:cubicBezTo>
+                <a:cubicBezTo>
+                  <a:pt x="10691638" y="28522"/>
+                  <a:pt x="10574319" y="29578"/>
+                  <a:pt x="10392636" y="18288"/>
+                </a:cubicBezTo>
+                <a:cubicBezTo>
+                  <a:pt x="10210953" y="6998"/>
+                  <a:pt x="9836277" y="-16742"/>
+                  <a:pt x="9497187" y="18288"/>
+                </a:cubicBezTo>
+                <a:cubicBezTo>
+                  <a:pt x="9158097" y="53318"/>
+                  <a:pt x="9119479" y="30714"/>
+                  <a:pt x="8818817" y="18288"/>
+                </a:cubicBezTo>
+                <a:cubicBezTo>
+                  <a:pt x="8518155" y="5863"/>
+                  <a:pt x="8640037" y="6483"/>
+                  <a:pt x="8466064" y="18288"/>
+                </a:cubicBezTo>
+                <a:cubicBezTo>
+                  <a:pt x="8292091" y="30093"/>
+                  <a:pt x="7997656" y="18914"/>
+                  <a:pt x="7787693" y="18288"/>
+                </a:cubicBezTo>
+                <a:cubicBezTo>
+                  <a:pt x="7577730" y="17662"/>
+                  <a:pt x="7412468" y="21416"/>
+                  <a:pt x="7217862" y="18288"/>
+                </a:cubicBezTo>
+                <a:cubicBezTo>
+                  <a:pt x="7023256" y="15160"/>
+                  <a:pt x="6898018" y="14824"/>
+                  <a:pt x="6648031" y="18288"/>
+                </a:cubicBezTo>
+                <a:cubicBezTo>
+                  <a:pt x="6398044" y="21752"/>
+                  <a:pt x="6254402" y="38625"/>
+                  <a:pt x="6078200" y="18288"/>
+                </a:cubicBezTo>
+                <a:cubicBezTo>
+                  <a:pt x="5901998" y="-2049"/>
+                  <a:pt x="5622886" y="3213"/>
+                  <a:pt x="5508368" y="18288"/>
+                </a:cubicBezTo>
+                <a:cubicBezTo>
+                  <a:pt x="5393850" y="33363"/>
+                  <a:pt x="5036260" y="26830"/>
+                  <a:pt x="4721459" y="18288"/>
+                </a:cubicBezTo>
+                <a:cubicBezTo>
+                  <a:pt x="4406658" y="9746"/>
+                  <a:pt x="4239221" y="41551"/>
+                  <a:pt x="4043088" y="18288"/>
+                </a:cubicBezTo>
+                <a:cubicBezTo>
+                  <a:pt x="3846955" y="-4975"/>
+                  <a:pt x="3818802" y="34658"/>
+                  <a:pt x="3690336" y="18288"/>
+                </a:cubicBezTo>
+                <a:cubicBezTo>
+                  <a:pt x="3561870" y="1918"/>
+                  <a:pt x="3265491" y="42194"/>
+                  <a:pt x="3120504" y="18288"/>
+                </a:cubicBezTo>
+                <a:cubicBezTo>
+                  <a:pt x="2975517" y="-5618"/>
+                  <a:pt x="2720254" y="36673"/>
+                  <a:pt x="2333595" y="18288"/>
+                </a:cubicBezTo>
+                <a:cubicBezTo>
+                  <a:pt x="1946936" y="-97"/>
+                  <a:pt x="2097241" y="5776"/>
+                  <a:pt x="1872303" y="18288"/>
+                </a:cubicBezTo>
+                <a:cubicBezTo>
+                  <a:pt x="1647365" y="30800"/>
+                  <a:pt x="1282708" y="45380"/>
+                  <a:pt x="976854" y="18288"/>
+                </a:cubicBezTo>
+                <a:cubicBezTo>
+                  <a:pt x="671000" y="-8804"/>
+                  <a:pt x="408401" y="-12775"/>
+                  <a:pt x="0" y="18288"/>
+                </a:cubicBezTo>
+                <a:cubicBezTo>
+                  <a:pt x="-213" y="9468"/>
+                  <a:pt x="187" y="4459"/>
+                  <a:pt x="0" y="0"/>
+                </a:cubicBezTo>
+                <a:close/>
+              </a:path>
+              <a:path w="10853928" h="18288" stroke="0" extrusionOk="0">
+                <a:moveTo>
+                  <a:pt x="0" y="0"/>
+                </a:moveTo>
+                <a:cubicBezTo>
+                  <a:pt x="267322" y="15284"/>
+                  <a:pt x="415388" y="-21048"/>
+                  <a:pt x="569831" y="0"/>
+                </a:cubicBezTo>
+                <a:cubicBezTo>
+                  <a:pt x="724274" y="21048"/>
+                  <a:pt x="769333" y="-2353"/>
+                  <a:pt x="922584" y="0"/>
+                </a:cubicBezTo>
+                <a:cubicBezTo>
+                  <a:pt x="1075835" y="2353"/>
+                  <a:pt x="1399490" y="-145"/>
+                  <a:pt x="1818033" y="0"/>
+                </a:cubicBezTo>
+                <a:cubicBezTo>
+                  <a:pt x="2236576" y="145"/>
+                  <a:pt x="2145330" y="5482"/>
+                  <a:pt x="2387864" y="0"/>
+                </a:cubicBezTo>
+                <a:cubicBezTo>
+                  <a:pt x="2630398" y="-5482"/>
+                  <a:pt x="2793207" y="18487"/>
+                  <a:pt x="2957695" y="0"/>
+                </a:cubicBezTo>
+                <a:cubicBezTo>
+                  <a:pt x="3122183" y="-18487"/>
+                  <a:pt x="3579141" y="19003"/>
+                  <a:pt x="3853144" y="0"/>
+                </a:cubicBezTo>
+                <a:cubicBezTo>
+                  <a:pt x="4127147" y="-19003"/>
+                  <a:pt x="4209857" y="12211"/>
+                  <a:pt x="4314436" y="0"/>
+                </a:cubicBezTo>
+                <a:cubicBezTo>
+                  <a:pt x="4419015" y="-12211"/>
+                  <a:pt x="4762459" y="-17220"/>
+                  <a:pt x="5209885" y="0"/>
+                </a:cubicBezTo>
+                <a:cubicBezTo>
+                  <a:pt x="5657311" y="17220"/>
+                  <a:pt x="5692663" y="-3290"/>
+                  <a:pt x="6105335" y="0"/>
+                </a:cubicBezTo>
+                <a:cubicBezTo>
+                  <a:pt x="6518007" y="3290"/>
+                  <a:pt x="6455516" y="-5124"/>
+                  <a:pt x="6783705" y="0"/>
+                </a:cubicBezTo>
+                <a:cubicBezTo>
+                  <a:pt x="7111894" y="5124"/>
+                  <a:pt x="7441941" y="-17829"/>
+                  <a:pt x="7679154" y="0"/>
+                </a:cubicBezTo>
+                <a:cubicBezTo>
+                  <a:pt x="7916367" y="17829"/>
+                  <a:pt x="8102967" y="-24363"/>
+                  <a:pt x="8248985" y="0"/>
+                </a:cubicBezTo>
+                <a:cubicBezTo>
+                  <a:pt x="8395003" y="24363"/>
+                  <a:pt x="8552393" y="25505"/>
+                  <a:pt x="8818817" y="0"/>
+                </a:cubicBezTo>
+                <a:cubicBezTo>
+                  <a:pt x="9085241" y="-25505"/>
+                  <a:pt x="9411308" y="38000"/>
+                  <a:pt x="9605726" y="0"/>
+                </a:cubicBezTo>
+                <a:cubicBezTo>
+                  <a:pt x="9800144" y="-38000"/>
+                  <a:pt x="10006468" y="-25741"/>
+                  <a:pt x="10175558" y="0"/>
+                </a:cubicBezTo>
+                <a:cubicBezTo>
+                  <a:pt x="10344648" y="25741"/>
+                  <a:pt x="10696282" y="695"/>
+                  <a:pt x="10853928" y="0"/>
+                </a:cubicBezTo>
+                <a:cubicBezTo>
+                  <a:pt x="10853521" y="8690"/>
+                  <a:pt x="10853774" y="14141"/>
+                  <a:pt x="10853928" y="18288"/>
+                </a:cubicBezTo>
+                <a:cubicBezTo>
+                  <a:pt x="10608124" y="24255"/>
+                  <a:pt x="10343415" y="22307"/>
+                  <a:pt x="10067018" y="18288"/>
+                </a:cubicBezTo>
+                <a:cubicBezTo>
+                  <a:pt x="9790621" y="14270"/>
+                  <a:pt x="9843266" y="3564"/>
+                  <a:pt x="9714266" y="18288"/>
+                </a:cubicBezTo>
+                <a:cubicBezTo>
+                  <a:pt x="9585266" y="33012"/>
+                  <a:pt x="9379484" y="1875"/>
+                  <a:pt x="9252974" y="18288"/>
+                </a:cubicBezTo>
+                <a:cubicBezTo>
+                  <a:pt x="9126464" y="34701"/>
+                  <a:pt x="8580678" y="-4904"/>
+                  <a:pt x="8357525" y="18288"/>
+                </a:cubicBezTo>
+                <a:cubicBezTo>
+                  <a:pt x="8134372" y="41480"/>
+                  <a:pt x="7903199" y="26458"/>
+                  <a:pt x="7679154" y="18288"/>
+                </a:cubicBezTo>
+                <a:cubicBezTo>
+                  <a:pt x="7455109" y="10118"/>
+                  <a:pt x="7435944" y="27109"/>
+                  <a:pt x="7217862" y="18288"/>
+                </a:cubicBezTo>
+                <a:cubicBezTo>
+                  <a:pt x="6999780" y="9467"/>
+                  <a:pt x="6680409" y="18985"/>
+                  <a:pt x="6539492" y="18288"/>
+                </a:cubicBezTo>
+                <a:cubicBezTo>
+                  <a:pt x="6398575" y="17592"/>
+                  <a:pt x="6312077" y="33018"/>
+                  <a:pt x="6186739" y="18288"/>
+                </a:cubicBezTo>
+                <a:cubicBezTo>
+                  <a:pt x="6061401" y="3558"/>
+                  <a:pt x="5947033" y="12075"/>
+                  <a:pt x="5833986" y="18288"/>
+                </a:cubicBezTo>
+                <a:cubicBezTo>
+                  <a:pt x="5720939" y="24501"/>
+                  <a:pt x="5482226" y="8586"/>
+                  <a:pt x="5155616" y="18288"/>
+                </a:cubicBezTo>
+                <a:cubicBezTo>
+                  <a:pt x="4829006" y="27991"/>
+                  <a:pt x="4841274" y="29316"/>
+                  <a:pt x="4694324" y="18288"/>
+                </a:cubicBezTo>
+                <a:cubicBezTo>
+                  <a:pt x="4547374" y="7260"/>
+                  <a:pt x="4077675" y="7013"/>
+                  <a:pt x="3907414" y="18288"/>
+                </a:cubicBezTo>
+                <a:cubicBezTo>
+                  <a:pt x="3737153" y="29564"/>
+                  <a:pt x="3538393" y="21630"/>
+                  <a:pt x="3446122" y="18288"/>
+                </a:cubicBezTo>
+                <a:cubicBezTo>
+                  <a:pt x="3353851" y="14946"/>
+                  <a:pt x="2990320" y="-8091"/>
+                  <a:pt x="2659212" y="18288"/>
+                </a:cubicBezTo>
+                <a:cubicBezTo>
+                  <a:pt x="2328104" y="44667"/>
+                  <a:pt x="2427653" y="9607"/>
+                  <a:pt x="2306460" y="18288"/>
+                </a:cubicBezTo>
+                <a:cubicBezTo>
+                  <a:pt x="2185267" y="26969"/>
+                  <a:pt x="1719763" y="3717"/>
+                  <a:pt x="1519550" y="18288"/>
+                </a:cubicBezTo>
+                <a:cubicBezTo>
+                  <a:pt x="1319337" y="32860"/>
+                  <a:pt x="1167371" y="17040"/>
+                  <a:pt x="1058258" y="18288"/>
+                </a:cubicBezTo>
+                <a:cubicBezTo>
+                  <a:pt x="949145" y="19536"/>
+                  <a:pt x="780234" y="31447"/>
+                  <a:pt x="705505" y="18288"/>
+                </a:cubicBezTo>
+                <a:cubicBezTo>
+                  <a:pt x="630776" y="5129"/>
+                  <a:pt x="215796" y="30056"/>
+                  <a:pt x="0" y="18288"/>
+                </a:cubicBezTo>
+                <a:cubicBezTo>
+                  <a:pt x="-53" y="11301"/>
+                  <a:pt x="-649" y="7756"/>
+                  <a:pt x="0" y="0"/>
+                </a:cubicBezTo>
+                <a:close/>
+              </a:path>
+            </a:pathLst>
+          </a:custGeom>
+          <a:solidFill>
+            <a:schemeClr val="accent2"/>
+          </a:solidFill>
+          <a:ln w="41275" cap="rnd">
+            <a:solidFill>
+              <a:schemeClr val="accent2"/>
+            </a:solidFill>
+            <a:round/>
+            <a:extLst>
+              <a:ext uri="{C807C97D-BFC1-408E-A445-0C87EB9F89A2}">
+                <ask:lineSketchStyleProps xmlns:ask="http://schemas.microsoft.com/office/drawing/2018/sketchyshapes" sd="1219033472">
+                  <a:prstGeom prst="rect">
+                    <a:avLst/>
+                  </a:prstGeom>
+                  <ask:type>
+                    <ask:lineSketchFreehand/>
+                  </ask:type>
+                </ask:lineSketchStyleProps>
+              </a:ext>
+            </a:extLst>
+          </a:ln>
+        </p:spPr>
+        <p:style>
+          <a:lnRef idx="2">
+            <a:schemeClr val="accent1">
+              <a:shade val="50000"/>
+            </a:schemeClr>
+          </a:lnRef>
+          <a:fillRef idx="1">
+            <a:schemeClr val="accent1"/>
+          </a:fillRef>
+          <a:effectRef idx="0">
+            <a:schemeClr val="accent1"/>
+          </a:effectRef>
+          <a:fontRef idx="minor">
+            <a:schemeClr val="lt1"/>
+          </a:fontRef>
+        </p:style>
+        <p:txBody>
+          <a:bodyPr rtlCol="0" anchor="ctr"/>
+          <a:lstStyle/>
+          <a:p>
+            <a:pPr algn="ctr"/>
+            <a:endParaRPr lang="en-US"/>
+          </a:p>
+        </p:txBody>
+      </p:sp>
+      <p:sp>
+        <p:nvSpPr>
+          <p:cNvPr id="5" name="Content Placeholder 4">
+            <a:extLst>
+              <a:ext uri="{FF2B5EF4-FFF2-40B4-BE49-F238E27FC236}">
+                <a16:creationId xmlns:a16="http://schemas.microsoft.com/office/drawing/2014/main" id="{9CDD473B-455C-247E-5EF8-85BBA20BFF57}"/>
+              </a:ext>
+            </a:extLst>
+          </p:cNvPr>
+          <p:cNvSpPr>
+            <a:spLocks noGrp="1"/>
+          </p:cNvSpPr>
+          <p:nvPr>
+            <p:ph idx="1"/>
+          </p:nvPr>
+        </p:nvSpPr>
+        <p:spPr>
+          <a:xfrm>
+            <a:off x="838200" y="1929384"/>
+            <a:ext cx="10515600" cy="4251960"/>
+          </a:xfrm>
+        </p:spPr>
+        <p:txBody>
+          <a:bodyPr>
+            <a:normAutofit/>
+          </a:bodyPr>
+          <a:lstStyle/>
+          <a:p>
+            <a:pPr marL="0" indent="0">
+              <a:buNone/>
+            </a:pPr>
+            <a:r>
+              <a:rPr lang="en-US" sz="2200" b="1" dirty="0">
+                <a:solidFill>
+                  <a:schemeClr val="accent5">
+                    <a:lumMod val="50000"/>
+                  </a:schemeClr>
+                </a:solidFill>
+              </a:rPr>
               <a:t>Method:</a:t>
             </a:r>
           </a:p>
@@ -12407,7 +14279,7 @@
 </p:sld>
 </file>
 
-<file path=ppt/slides/slide4.xml><?xml version="1.0" encoding="utf-8"?>
+<file path=ppt/slides/slide5.xml><?xml version="1.0" encoding="utf-8"?>
 <p:sld xmlns:a="http://schemas.openxmlformats.org/drawingml/2006/main" xmlns:r="http://schemas.openxmlformats.org/officeDocument/2006/relationships" xmlns:p="http://schemas.openxmlformats.org/presentationml/2006/main">
   <p:cSld>
     <p:bg>
@@ -13210,7 +15082,7 @@
 </p:sld>
 </file>
 
-<file path=ppt/slides/slide5.xml><?xml version="1.0" encoding="utf-8"?>
+<file path=ppt/slides/slide6.xml><?xml version="1.0" encoding="utf-8"?>
 <p:sld xmlns:a="http://schemas.openxmlformats.org/drawingml/2006/main" xmlns:r="http://schemas.openxmlformats.org/officeDocument/2006/relationships" xmlns:p="http://schemas.openxmlformats.org/presentationml/2006/main">
   <p:cSld>
     <p:bg>
@@ -14010,7 +15882,7 @@
 </p:sld>
 </file>
 
-<file path=ppt/slides/slide6.xml><?xml version="1.0" encoding="utf-8"?>
+<file path=ppt/slides/slide7.xml><?xml version="1.0" encoding="utf-8"?>
 <p:sld xmlns:a="http://schemas.openxmlformats.org/drawingml/2006/main" xmlns:r="http://schemas.openxmlformats.org/officeDocument/2006/relationships" xmlns:p="http://schemas.openxmlformats.org/presentationml/2006/main">
   <p:cSld>
     <p:bg>
@@ -14810,7 +16682,7 @@
 </p:sld>
 </file>
 
-<file path=ppt/slides/slide7.xml><?xml version="1.0" encoding="utf-8"?>
+<file path=ppt/slides/slide8.xml><?xml version="1.0" encoding="utf-8"?>
 <p:sld xmlns:a="http://schemas.openxmlformats.org/drawingml/2006/main" xmlns:r="http://schemas.openxmlformats.org/officeDocument/2006/relationships" xmlns:p="http://schemas.openxmlformats.org/presentationml/2006/main">
   <p:cSld>
     <p:bg>
@@ -15610,7 +17482,7 @@
 </p:sld>
 </file>
 
-<file path=ppt/slides/slide8.xml><?xml version="1.0" encoding="utf-8"?>
+<file path=ppt/slides/slide9.xml><?xml version="1.0" encoding="utf-8"?>
 <p:sld xmlns:a="http://schemas.openxmlformats.org/drawingml/2006/main" xmlns:r="http://schemas.openxmlformats.org/officeDocument/2006/relationships" xmlns:p="http://schemas.openxmlformats.org/presentationml/2006/main">
   <p:cSld>
     <p:bg>
@@ -16401,962 +18273,6 @@
     <p:extLst>
       <p:ext uri="{BB962C8B-B14F-4D97-AF65-F5344CB8AC3E}">
         <p14:creationId xmlns:p14="http://schemas.microsoft.com/office/powerpoint/2010/main" val="3261761997"/>
-      </p:ext>
-    </p:extLst>
-  </p:cSld>
-  <p:clrMapOvr>
-    <a:masterClrMapping/>
-  </p:clrMapOvr>
-</p:sld>
-</file>
-
-<file path=ppt/slides/slide9.xml><?xml version="1.0" encoding="utf-8"?>
-<p:sld xmlns:a="http://schemas.openxmlformats.org/drawingml/2006/main" xmlns:r="http://schemas.openxmlformats.org/officeDocument/2006/relationships" xmlns:p="http://schemas.openxmlformats.org/presentationml/2006/main">
-  <p:cSld>
-    <p:bg>
-      <p:bgPr>
-        <a:solidFill>
-          <a:schemeClr val="bg1"/>
-        </a:solidFill>
-        <a:effectLst/>
-      </p:bgPr>
-    </p:bg>
-    <p:spTree>
-      <p:nvGrpSpPr>
-        <p:cNvPr id="1" name=""/>
-        <p:cNvGrpSpPr/>
-        <p:nvPr/>
-      </p:nvGrpSpPr>
-      <p:grpSpPr>
-        <a:xfrm>
-          <a:off x="0" y="0"/>
-          <a:ext cx="0" cy="0"/>
-          <a:chOff x="0" y="0"/>
-          <a:chExt cx="0" cy="0"/>
-        </a:xfrm>
-      </p:grpSpPr>
-      <p:sp useBgFill="1">
-        <p:nvSpPr>
-          <p:cNvPr id="8" name="Rectangle 7">
-            <a:extLst>
-              <a:ext uri="{FF2B5EF4-FFF2-40B4-BE49-F238E27FC236}">
-                <a16:creationId xmlns:a16="http://schemas.microsoft.com/office/drawing/2014/main" id="{100EDD19-6802-4EC3-95CE-CFFAB042CFD6}"/>
-              </a:ext>
-              <a:ext uri="{C183D7F6-B498-43B3-948B-1728B52AA6E4}">
-                <adec:decorative xmlns:adec="http://schemas.microsoft.com/office/drawing/2017/decorative" val="1"/>
-              </a:ext>
-            </a:extLst>
-          </p:cNvPr>
-          <p:cNvSpPr>
-            <a:spLocks noGrp="1" noRot="1" noChangeAspect="1" noMove="1" noResize="1" noEditPoints="1" noAdjustHandles="1" noChangeArrowheads="1" noChangeShapeType="1" noTextEdit="1"/>
-          </p:cNvSpPr>
-          <p:nvPr>
-            <p:extLst>
-              <p:ext uri="{386F3935-93C4-4BCD-93E2-E3B085C9AB24}">
-                <p16:designElem xmlns:p16="http://schemas.microsoft.com/office/powerpoint/2015/main" val="1"/>
-              </p:ext>
-            </p:extLst>
-          </p:nvPr>
-        </p:nvSpPr>
-        <p:spPr>
-          <a:xfrm>
-            <a:off x="0" y="0"/>
-            <a:ext cx="12188952" cy="6858000"/>
-          </a:xfrm>
-          <a:prstGeom prst="rect">
-            <a:avLst/>
-          </a:prstGeom>
-          <a:ln>
-            <a:noFill/>
-          </a:ln>
-        </p:spPr>
-        <p:style>
-          <a:lnRef idx="2">
-            <a:schemeClr val="accent1">
-              <a:shade val="50000"/>
-            </a:schemeClr>
-          </a:lnRef>
-          <a:fillRef idx="1">
-            <a:schemeClr val="accent1"/>
-          </a:fillRef>
-          <a:effectRef idx="0">
-            <a:schemeClr val="accent1"/>
-          </a:effectRef>
-          <a:fontRef idx="minor">
-            <a:schemeClr val="lt1"/>
-          </a:fontRef>
-        </p:style>
-        <p:txBody>
-          <a:bodyPr rtlCol="0" anchor="ctr"/>
-          <a:lstStyle/>
-          <a:p>
-            <a:pPr algn="ctr"/>
-            <a:endParaRPr lang="en-US"/>
-          </a:p>
-        </p:txBody>
-      </p:sp>
-      <p:sp>
-        <p:nvSpPr>
-          <p:cNvPr id="2" name="Title 1">
-            <a:extLst>
-              <a:ext uri="{FF2B5EF4-FFF2-40B4-BE49-F238E27FC236}">
-                <a16:creationId xmlns:a16="http://schemas.microsoft.com/office/drawing/2014/main" id="{F61A8933-A8F5-1FF0-048E-77BD345837BA}"/>
-              </a:ext>
-            </a:extLst>
-          </p:cNvPr>
-          <p:cNvSpPr>
-            <a:spLocks noGrp="1"/>
-          </p:cNvSpPr>
-          <p:nvPr>
-            <p:ph type="title"/>
-          </p:nvPr>
-        </p:nvSpPr>
-        <p:spPr>
-          <a:xfrm>
-            <a:off x="838200" y="365125"/>
-            <a:ext cx="10515600" cy="1325563"/>
-          </a:xfrm>
-        </p:spPr>
-        <p:txBody>
-          <a:bodyPr>
-            <a:noAutofit/>
-          </a:bodyPr>
-          <a:lstStyle/>
-          <a:p>
-            <a:r>
-              <a:rPr lang="en-US" sz="3600" dirty="0"/>
-              <a:t>Economic Climate: Impact of Recessions on Prices</a:t>
-            </a:r>
-          </a:p>
-        </p:txBody>
-      </p:sp>
-      <p:sp>
-        <p:nvSpPr>
-          <p:cNvPr id="10" name="sketch line">
-            <a:extLst>
-              <a:ext uri="{FF2B5EF4-FFF2-40B4-BE49-F238E27FC236}">
-                <a16:creationId xmlns:a16="http://schemas.microsoft.com/office/drawing/2014/main" id="{DB17E863-922E-4C26-BD64-E8FD41D28661}"/>
-              </a:ext>
-              <a:ext uri="{C183D7F6-B498-43B3-948B-1728B52AA6E4}">
-                <adec:decorative xmlns:adec="http://schemas.microsoft.com/office/drawing/2017/decorative" val="1"/>
-              </a:ext>
-            </a:extLst>
-          </p:cNvPr>
-          <p:cNvSpPr>
-            <a:spLocks noGrp="1" noRot="1" noChangeAspect="1" noMove="1" noResize="1" noEditPoints="1" noAdjustHandles="1" noChangeArrowheads="1" noChangeShapeType="1" noTextEdit="1"/>
-          </p:cNvSpPr>
-          <p:nvPr>
-            <p:extLst>
-              <p:ext uri="{386F3935-93C4-4BCD-93E2-E3B085C9AB24}">
-                <p16:designElem xmlns:p16="http://schemas.microsoft.com/office/powerpoint/2015/main" val="1"/>
-              </p:ext>
-            </p:extLst>
-          </p:nvPr>
-        </p:nvSpPr>
-        <p:spPr>
-          <a:xfrm>
-            <a:off x="669036" y="1677373"/>
-            <a:ext cx="10853928" cy="18288"/>
-          </a:xfrm>
-          <a:custGeom>
-            <a:avLst/>
-            <a:gdLst>
-              <a:gd name="connsiteX0" fmla="*/ 0 w 10853928"/>
-              <a:gd name="connsiteY0" fmla="*/ 0 h 18288"/>
-              <a:gd name="connsiteX1" fmla="*/ 461292 w 10853928"/>
-              <a:gd name="connsiteY1" fmla="*/ 0 h 18288"/>
-              <a:gd name="connsiteX2" fmla="*/ 1139662 w 10853928"/>
-              <a:gd name="connsiteY2" fmla="*/ 0 h 18288"/>
-              <a:gd name="connsiteX3" fmla="*/ 1926572 w 10853928"/>
-              <a:gd name="connsiteY3" fmla="*/ 0 h 18288"/>
-              <a:gd name="connsiteX4" fmla="*/ 2279325 w 10853928"/>
-              <a:gd name="connsiteY4" fmla="*/ 0 h 18288"/>
-              <a:gd name="connsiteX5" fmla="*/ 2632078 w 10853928"/>
-              <a:gd name="connsiteY5" fmla="*/ 0 h 18288"/>
-              <a:gd name="connsiteX6" fmla="*/ 3527527 w 10853928"/>
-              <a:gd name="connsiteY6" fmla="*/ 0 h 18288"/>
-              <a:gd name="connsiteX7" fmla="*/ 4205897 w 10853928"/>
-              <a:gd name="connsiteY7" fmla="*/ 0 h 18288"/>
-              <a:gd name="connsiteX8" fmla="*/ 4558650 w 10853928"/>
-              <a:gd name="connsiteY8" fmla="*/ 0 h 18288"/>
-              <a:gd name="connsiteX9" fmla="*/ 5237020 w 10853928"/>
-              <a:gd name="connsiteY9" fmla="*/ 0 h 18288"/>
-              <a:gd name="connsiteX10" fmla="*/ 6132469 w 10853928"/>
-              <a:gd name="connsiteY10" fmla="*/ 0 h 18288"/>
-              <a:gd name="connsiteX11" fmla="*/ 6702301 w 10853928"/>
-              <a:gd name="connsiteY11" fmla="*/ 0 h 18288"/>
-              <a:gd name="connsiteX12" fmla="*/ 7272132 w 10853928"/>
-              <a:gd name="connsiteY12" fmla="*/ 0 h 18288"/>
-              <a:gd name="connsiteX13" fmla="*/ 7950502 w 10853928"/>
-              <a:gd name="connsiteY13" fmla="*/ 0 h 18288"/>
-              <a:gd name="connsiteX14" fmla="*/ 8737412 w 10853928"/>
-              <a:gd name="connsiteY14" fmla="*/ 0 h 18288"/>
-              <a:gd name="connsiteX15" fmla="*/ 9524322 w 10853928"/>
-              <a:gd name="connsiteY15" fmla="*/ 0 h 18288"/>
-              <a:gd name="connsiteX16" fmla="*/ 10853928 w 10853928"/>
-              <a:gd name="connsiteY16" fmla="*/ 0 h 18288"/>
-              <a:gd name="connsiteX17" fmla="*/ 10853928 w 10853928"/>
-              <a:gd name="connsiteY17" fmla="*/ 18288 h 18288"/>
-              <a:gd name="connsiteX18" fmla="*/ 10392636 w 10853928"/>
-              <a:gd name="connsiteY18" fmla="*/ 18288 h 18288"/>
-              <a:gd name="connsiteX19" fmla="*/ 9497187 w 10853928"/>
-              <a:gd name="connsiteY19" fmla="*/ 18288 h 18288"/>
-              <a:gd name="connsiteX20" fmla="*/ 8818817 w 10853928"/>
-              <a:gd name="connsiteY20" fmla="*/ 18288 h 18288"/>
-              <a:gd name="connsiteX21" fmla="*/ 8466064 w 10853928"/>
-              <a:gd name="connsiteY21" fmla="*/ 18288 h 18288"/>
-              <a:gd name="connsiteX22" fmla="*/ 7787693 w 10853928"/>
-              <a:gd name="connsiteY22" fmla="*/ 18288 h 18288"/>
-              <a:gd name="connsiteX23" fmla="*/ 7217862 w 10853928"/>
-              <a:gd name="connsiteY23" fmla="*/ 18288 h 18288"/>
-              <a:gd name="connsiteX24" fmla="*/ 6648031 w 10853928"/>
-              <a:gd name="connsiteY24" fmla="*/ 18288 h 18288"/>
-              <a:gd name="connsiteX25" fmla="*/ 6078200 w 10853928"/>
-              <a:gd name="connsiteY25" fmla="*/ 18288 h 18288"/>
-              <a:gd name="connsiteX26" fmla="*/ 5508368 w 10853928"/>
-              <a:gd name="connsiteY26" fmla="*/ 18288 h 18288"/>
-              <a:gd name="connsiteX27" fmla="*/ 4721459 w 10853928"/>
-              <a:gd name="connsiteY27" fmla="*/ 18288 h 18288"/>
-              <a:gd name="connsiteX28" fmla="*/ 4043088 w 10853928"/>
-              <a:gd name="connsiteY28" fmla="*/ 18288 h 18288"/>
-              <a:gd name="connsiteX29" fmla="*/ 3690336 w 10853928"/>
-              <a:gd name="connsiteY29" fmla="*/ 18288 h 18288"/>
-              <a:gd name="connsiteX30" fmla="*/ 3120504 w 10853928"/>
-              <a:gd name="connsiteY30" fmla="*/ 18288 h 18288"/>
-              <a:gd name="connsiteX31" fmla="*/ 2333595 w 10853928"/>
-              <a:gd name="connsiteY31" fmla="*/ 18288 h 18288"/>
-              <a:gd name="connsiteX32" fmla="*/ 1872303 w 10853928"/>
-              <a:gd name="connsiteY32" fmla="*/ 18288 h 18288"/>
-              <a:gd name="connsiteX33" fmla="*/ 976854 w 10853928"/>
-              <a:gd name="connsiteY33" fmla="*/ 18288 h 18288"/>
-              <a:gd name="connsiteX34" fmla="*/ 0 w 10853928"/>
-              <a:gd name="connsiteY34" fmla="*/ 18288 h 18288"/>
-              <a:gd name="connsiteX35" fmla="*/ 0 w 10853928"/>
-              <a:gd name="connsiteY35" fmla="*/ 0 h 18288"/>
-            </a:gdLst>
-            <a:ahLst/>
-            <a:cxnLst>
-              <a:cxn ang="0">
-                <a:pos x="connsiteX0" y="connsiteY0"/>
-              </a:cxn>
-              <a:cxn ang="0">
-                <a:pos x="connsiteX1" y="connsiteY1"/>
-              </a:cxn>
-              <a:cxn ang="0">
-                <a:pos x="connsiteX2" y="connsiteY2"/>
-              </a:cxn>
-              <a:cxn ang="0">
-                <a:pos x="connsiteX3" y="connsiteY3"/>
-              </a:cxn>
-              <a:cxn ang="0">
-                <a:pos x="connsiteX4" y="connsiteY4"/>
-              </a:cxn>
-              <a:cxn ang="0">
-                <a:pos x="connsiteX5" y="connsiteY5"/>
-              </a:cxn>
-              <a:cxn ang="0">
-                <a:pos x="connsiteX6" y="connsiteY6"/>
-              </a:cxn>
-              <a:cxn ang="0">
-                <a:pos x="connsiteX7" y="connsiteY7"/>
-              </a:cxn>
-              <a:cxn ang="0">
-                <a:pos x="connsiteX8" y="connsiteY8"/>
-              </a:cxn>
-              <a:cxn ang="0">
-                <a:pos x="connsiteX9" y="connsiteY9"/>
-              </a:cxn>
-              <a:cxn ang="0">
-                <a:pos x="connsiteX10" y="connsiteY10"/>
-              </a:cxn>
-              <a:cxn ang="0">
-                <a:pos x="connsiteX11" y="connsiteY11"/>
-              </a:cxn>
-              <a:cxn ang="0">
-                <a:pos x="connsiteX12" y="connsiteY12"/>
-              </a:cxn>
-              <a:cxn ang="0">
-                <a:pos x="connsiteX13" y="connsiteY13"/>
-              </a:cxn>
-              <a:cxn ang="0">
-                <a:pos x="connsiteX14" y="connsiteY14"/>
-              </a:cxn>
-              <a:cxn ang="0">
-                <a:pos x="connsiteX15" y="connsiteY15"/>
-              </a:cxn>
-              <a:cxn ang="0">
-                <a:pos x="connsiteX16" y="connsiteY16"/>
-              </a:cxn>
-              <a:cxn ang="0">
-                <a:pos x="connsiteX17" y="connsiteY17"/>
-              </a:cxn>
-              <a:cxn ang="0">
-                <a:pos x="connsiteX18" y="connsiteY18"/>
-              </a:cxn>
-              <a:cxn ang="0">
-                <a:pos x="connsiteX19" y="connsiteY19"/>
-              </a:cxn>
-              <a:cxn ang="0">
-                <a:pos x="connsiteX20" y="connsiteY20"/>
-              </a:cxn>
-              <a:cxn ang="0">
-                <a:pos x="connsiteX21" y="connsiteY21"/>
-              </a:cxn>
-              <a:cxn ang="0">
-                <a:pos x="connsiteX22" y="connsiteY22"/>
-              </a:cxn>
-              <a:cxn ang="0">
-                <a:pos x="connsiteX23" y="connsiteY23"/>
-              </a:cxn>
-              <a:cxn ang="0">
-                <a:pos x="connsiteX24" y="connsiteY24"/>
-              </a:cxn>
-              <a:cxn ang="0">
-                <a:pos x="connsiteX25" y="connsiteY25"/>
-              </a:cxn>
-              <a:cxn ang="0">
-                <a:pos x="connsiteX26" y="connsiteY26"/>
-              </a:cxn>
-              <a:cxn ang="0">
-                <a:pos x="connsiteX27" y="connsiteY27"/>
-              </a:cxn>
-              <a:cxn ang="0">
-                <a:pos x="connsiteX28" y="connsiteY28"/>
-              </a:cxn>
-              <a:cxn ang="0">
-                <a:pos x="connsiteX29" y="connsiteY29"/>
-              </a:cxn>
-              <a:cxn ang="0">
-                <a:pos x="connsiteX30" y="connsiteY30"/>
-              </a:cxn>
-              <a:cxn ang="0">
-                <a:pos x="connsiteX31" y="connsiteY31"/>
-              </a:cxn>
-              <a:cxn ang="0">
-                <a:pos x="connsiteX32" y="connsiteY32"/>
-              </a:cxn>
-              <a:cxn ang="0">
-                <a:pos x="connsiteX33" y="connsiteY33"/>
-              </a:cxn>
-              <a:cxn ang="0">
-                <a:pos x="connsiteX34" y="connsiteY34"/>
-              </a:cxn>
-              <a:cxn ang="0">
-                <a:pos x="connsiteX35" y="connsiteY35"/>
-              </a:cxn>
-            </a:cxnLst>
-            <a:rect l="l" t="t" r="r" b="b"/>
-            <a:pathLst>
-              <a:path w="10853928" h="18288" fill="none" extrusionOk="0">
-                <a:moveTo>
-                  <a:pt x="0" y="0"/>
-                </a:moveTo>
-                <a:cubicBezTo>
-                  <a:pt x="146993" y="-19076"/>
-                  <a:pt x="347684" y="-4790"/>
-                  <a:pt x="461292" y="0"/>
-                </a:cubicBezTo>
-                <a:cubicBezTo>
-                  <a:pt x="574900" y="4790"/>
-                  <a:pt x="808367" y="19821"/>
-                  <a:pt x="1139662" y="0"/>
-                </a:cubicBezTo>
-                <a:cubicBezTo>
-                  <a:pt x="1470957" y="-19821"/>
-                  <a:pt x="1627405" y="5721"/>
-                  <a:pt x="1926572" y="0"/>
-                </a:cubicBezTo>
-                <a:cubicBezTo>
-                  <a:pt x="2225739" y="-5721"/>
-                  <a:pt x="2137730" y="-3235"/>
-                  <a:pt x="2279325" y="0"/>
-                </a:cubicBezTo>
-                <a:cubicBezTo>
-                  <a:pt x="2420920" y="3235"/>
-                  <a:pt x="2456518" y="9685"/>
-                  <a:pt x="2632078" y="0"/>
-                </a:cubicBezTo>
-                <a:cubicBezTo>
-                  <a:pt x="2807638" y="-9685"/>
-                  <a:pt x="3211516" y="-43007"/>
-                  <a:pt x="3527527" y="0"/>
-                </a:cubicBezTo>
-                <a:cubicBezTo>
-                  <a:pt x="3843538" y="43007"/>
-                  <a:pt x="4058833" y="22042"/>
-                  <a:pt x="4205897" y="0"/>
-                </a:cubicBezTo>
-                <a:cubicBezTo>
-                  <a:pt x="4352961" y="-22042"/>
-                  <a:pt x="4474805" y="-11846"/>
-                  <a:pt x="4558650" y="0"/>
-                </a:cubicBezTo>
-                <a:cubicBezTo>
-                  <a:pt x="4642495" y="11846"/>
-                  <a:pt x="5041928" y="-6069"/>
-                  <a:pt x="5237020" y="0"/>
-                </a:cubicBezTo>
-                <a:cubicBezTo>
-                  <a:pt x="5432112" y="6069"/>
-                  <a:pt x="5943266" y="-17479"/>
-                  <a:pt x="6132469" y="0"/>
-                </a:cubicBezTo>
-                <a:cubicBezTo>
-                  <a:pt x="6321672" y="17479"/>
-                  <a:pt x="6483872" y="26234"/>
-                  <a:pt x="6702301" y="0"/>
-                </a:cubicBezTo>
-                <a:cubicBezTo>
-                  <a:pt x="6920730" y="-26234"/>
-                  <a:pt x="6991194" y="-15156"/>
-                  <a:pt x="7272132" y="0"/>
-                </a:cubicBezTo>
-                <a:cubicBezTo>
-                  <a:pt x="7553070" y="15156"/>
-                  <a:pt x="7684444" y="-32961"/>
-                  <a:pt x="7950502" y="0"/>
-                </a:cubicBezTo>
-                <a:cubicBezTo>
-                  <a:pt x="8216560" y="32961"/>
-                  <a:pt x="8493290" y="-10491"/>
-                  <a:pt x="8737412" y="0"/>
-                </a:cubicBezTo>
-                <a:cubicBezTo>
-                  <a:pt x="8981534" y="10491"/>
-                  <a:pt x="9191586" y="-13899"/>
-                  <a:pt x="9524322" y="0"/>
-                </a:cubicBezTo>
-                <a:cubicBezTo>
-                  <a:pt x="9857058" y="13899"/>
-                  <a:pt x="10297509" y="7485"/>
-                  <a:pt x="10853928" y="0"/>
-                </a:cubicBezTo>
-                <a:cubicBezTo>
-                  <a:pt x="10854574" y="4451"/>
-                  <a:pt x="10854418" y="9226"/>
-                  <a:pt x="10853928" y="18288"/>
-                </a:cubicBezTo>
-                <a:cubicBezTo>
-                  <a:pt x="10691638" y="28522"/>
-                  <a:pt x="10574319" y="29578"/>
-                  <a:pt x="10392636" y="18288"/>
-                </a:cubicBezTo>
-                <a:cubicBezTo>
-                  <a:pt x="10210953" y="6998"/>
-                  <a:pt x="9836277" y="-16742"/>
-                  <a:pt x="9497187" y="18288"/>
-                </a:cubicBezTo>
-                <a:cubicBezTo>
-                  <a:pt x="9158097" y="53318"/>
-                  <a:pt x="9119479" y="30714"/>
-                  <a:pt x="8818817" y="18288"/>
-                </a:cubicBezTo>
-                <a:cubicBezTo>
-                  <a:pt x="8518155" y="5863"/>
-                  <a:pt x="8640037" y="6483"/>
-                  <a:pt x="8466064" y="18288"/>
-                </a:cubicBezTo>
-                <a:cubicBezTo>
-                  <a:pt x="8292091" y="30093"/>
-                  <a:pt x="7997656" y="18914"/>
-                  <a:pt x="7787693" y="18288"/>
-                </a:cubicBezTo>
-                <a:cubicBezTo>
-                  <a:pt x="7577730" y="17662"/>
-                  <a:pt x="7412468" y="21416"/>
-                  <a:pt x="7217862" y="18288"/>
-                </a:cubicBezTo>
-                <a:cubicBezTo>
-                  <a:pt x="7023256" y="15160"/>
-                  <a:pt x="6898018" y="14824"/>
-                  <a:pt x="6648031" y="18288"/>
-                </a:cubicBezTo>
-                <a:cubicBezTo>
-                  <a:pt x="6398044" y="21752"/>
-                  <a:pt x="6254402" y="38625"/>
-                  <a:pt x="6078200" y="18288"/>
-                </a:cubicBezTo>
-                <a:cubicBezTo>
-                  <a:pt x="5901998" y="-2049"/>
-                  <a:pt x="5622886" y="3213"/>
-                  <a:pt x="5508368" y="18288"/>
-                </a:cubicBezTo>
-                <a:cubicBezTo>
-                  <a:pt x="5393850" y="33363"/>
-                  <a:pt x="5036260" y="26830"/>
-                  <a:pt x="4721459" y="18288"/>
-                </a:cubicBezTo>
-                <a:cubicBezTo>
-                  <a:pt x="4406658" y="9746"/>
-                  <a:pt x="4239221" y="41551"/>
-                  <a:pt x="4043088" y="18288"/>
-                </a:cubicBezTo>
-                <a:cubicBezTo>
-                  <a:pt x="3846955" y="-4975"/>
-                  <a:pt x="3818802" y="34658"/>
-                  <a:pt x="3690336" y="18288"/>
-                </a:cubicBezTo>
-                <a:cubicBezTo>
-                  <a:pt x="3561870" y="1918"/>
-                  <a:pt x="3265491" y="42194"/>
-                  <a:pt x="3120504" y="18288"/>
-                </a:cubicBezTo>
-                <a:cubicBezTo>
-                  <a:pt x="2975517" y="-5618"/>
-                  <a:pt x="2720254" y="36673"/>
-                  <a:pt x="2333595" y="18288"/>
-                </a:cubicBezTo>
-                <a:cubicBezTo>
-                  <a:pt x="1946936" y="-97"/>
-                  <a:pt x="2097241" y="5776"/>
-                  <a:pt x="1872303" y="18288"/>
-                </a:cubicBezTo>
-                <a:cubicBezTo>
-                  <a:pt x="1647365" y="30800"/>
-                  <a:pt x="1282708" y="45380"/>
-                  <a:pt x="976854" y="18288"/>
-                </a:cubicBezTo>
-                <a:cubicBezTo>
-                  <a:pt x="671000" y="-8804"/>
-                  <a:pt x="408401" y="-12775"/>
-                  <a:pt x="0" y="18288"/>
-                </a:cubicBezTo>
-                <a:cubicBezTo>
-                  <a:pt x="-213" y="9468"/>
-                  <a:pt x="187" y="4459"/>
-                  <a:pt x="0" y="0"/>
-                </a:cubicBezTo>
-                <a:close/>
-              </a:path>
-              <a:path w="10853928" h="18288" stroke="0" extrusionOk="0">
-                <a:moveTo>
-                  <a:pt x="0" y="0"/>
-                </a:moveTo>
-                <a:cubicBezTo>
-                  <a:pt x="267322" y="15284"/>
-                  <a:pt x="415388" y="-21048"/>
-                  <a:pt x="569831" y="0"/>
-                </a:cubicBezTo>
-                <a:cubicBezTo>
-                  <a:pt x="724274" y="21048"/>
-                  <a:pt x="769333" y="-2353"/>
-                  <a:pt x="922584" y="0"/>
-                </a:cubicBezTo>
-                <a:cubicBezTo>
-                  <a:pt x="1075835" y="2353"/>
-                  <a:pt x="1399490" y="-145"/>
-                  <a:pt x="1818033" y="0"/>
-                </a:cubicBezTo>
-                <a:cubicBezTo>
-                  <a:pt x="2236576" y="145"/>
-                  <a:pt x="2145330" y="5482"/>
-                  <a:pt x="2387864" y="0"/>
-                </a:cubicBezTo>
-                <a:cubicBezTo>
-                  <a:pt x="2630398" y="-5482"/>
-                  <a:pt x="2793207" y="18487"/>
-                  <a:pt x="2957695" y="0"/>
-                </a:cubicBezTo>
-                <a:cubicBezTo>
-                  <a:pt x="3122183" y="-18487"/>
-                  <a:pt x="3579141" y="19003"/>
-                  <a:pt x="3853144" y="0"/>
-                </a:cubicBezTo>
-                <a:cubicBezTo>
-                  <a:pt x="4127147" y="-19003"/>
-                  <a:pt x="4209857" y="12211"/>
-                  <a:pt x="4314436" y="0"/>
-                </a:cubicBezTo>
-                <a:cubicBezTo>
-                  <a:pt x="4419015" y="-12211"/>
-                  <a:pt x="4762459" y="-17220"/>
-                  <a:pt x="5209885" y="0"/>
-                </a:cubicBezTo>
-                <a:cubicBezTo>
-                  <a:pt x="5657311" y="17220"/>
-                  <a:pt x="5692663" y="-3290"/>
-                  <a:pt x="6105335" y="0"/>
-                </a:cubicBezTo>
-                <a:cubicBezTo>
-                  <a:pt x="6518007" y="3290"/>
-                  <a:pt x="6455516" y="-5124"/>
-                  <a:pt x="6783705" y="0"/>
-                </a:cubicBezTo>
-                <a:cubicBezTo>
-                  <a:pt x="7111894" y="5124"/>
-                  <a:pt x="7441941" y="-17829"/>
-                  <a:pt x="7679154" y="0"/>
-                </a:cubicBezTo>
-                <a:cubicBezTo>
-                  <a:pt x="7916367" y="17829"/>
-                  <a:pt x="8102967" y="-24363"/>
-                  <a:pt x="8248985" y="0"/>
-                </a:cubicBezTo>
-                <a:cubicBezTo>
-                  <a:pt x="8395003" y="24363"/>
-                  <a:pt x="8552393" y="25505"/>
-                  <a:pt x="8818817" y="0"/>
-                </a:cubicBezTo>
-                <a:cubicBezTo>
-                  <a:pt x="9085241" y="-25505"/>
-                  <a:pt x="9411308" y="38000"/>
-                  <a:pt x="9605726" y="0"/>
-                </a:cubicBezTo>
-                <a:cubicBezTo>
-                  <a:pt x="9800144" y="-38000"/>
-                  <a:pt x="10006468" y="-25741"/>
-                  <a:pt x="10175558" y="0"/>
-                </a:cubicBezTo>
-                <a:cubicBezTo>
-                  <a:pt x="10344648" y="25741"/>
-                  <a:pt x="10696282" y="695"/>
-                  <a:pt x="10853928" y="0"/>
-                </a:cubicBezTo>
-                <a:cubicBezTo>
-                  <a:pt x="10853521" y="8690"/>
-                  <a:pt x="10853774" y="14141"/>
-                  <a:pt x="10853928" y="18288"/>
-                </a:cubicBezTo>
-                <a:cubicBezTo>
-                  <a:pt x="10608124" y="24255"/>
-                  <a:pt x="10343415" y="22307"/>
-                  <a:pt x="10067018" y="18288"/>
-                </a:cubicBezTo>
-                <a:cubicBezTo>
-                  <a:pt x="9790621" y="14270"/>
-                  <a:pt x="9843266" y="3564"/>
-                  <a:pt x="9714266" y="18288"/>
-                </a:cubicBezTo>
-                <a:cubicBezTo>
-                  <a:pt x="9585266" y="33012"/>
-                  <a:pt x="9379484" y="1875"/>
-                  <a:pt x="9252974" y="18288"/>
-                </a:cubicBezTo>
-                <a:cubicBezTo>
-                  <a:pt x="9126464" y="34701"/>
-                  <a:pt x="8580678" y="-4904"/>
-                  <a:pt x="8357525" y="18288"/>
-                </a:cubicBezTo>
-                <a:cubicBezTo>
-                  <a:pt x="8134372" y="41480"/>
-                  <a:pt x="7903199" y="26458"/>
-                  <a:pt x="7679154" y="18288"/>
-                </a:cubicBezTo>
-                <a:cubicBezTo>
-                  <a:pt x="7455109" y="10118"/>
-                  <a:pt x="7435944" y="27109"/>
-                  <a:pt x="7217862" y="18288"/>
-                </a:cubicBezTo>
-                <a:cubicBezTo>
-                  <a:pt x="6999780" y="9467"/>
-                  <a:pt x="6680409" y="18985"/>
-                  <a:pt x="6539492" y="18288"/>
-                </a:cubicBezTo>
-                <a:cubicBezTo>
-                  <a:pt x="6398575" y="17592"/>
-                  <a:pt x="6312077" y="33018"/>
-                  <a:pt x="6186739" y="18288"/>
-                </a:cubicBezTo>
-                <a:cubicBezTo>
-                  <a:pt x="6061401" y="3558"/>
-                  <a:pt x="5947033" y="12075"/>
-                  <a:pt x="5833986" y="18288"/>
-                </a:cubicBezTo>
-                <a:cubicBezTo>
-                  <a:pt x="5720939" y="24501"/>
-                  <a:pt x="5482226" y="8586"/>
-                  <a:pt x="5155616" y="18288"/>
-                </a:cubicBezTo>
-                <a:cubicBezTo>
-                  <a:pt x="4829006" y="27991"/>
-                  <a:pt x="4841274" y="29316"/>
-                  <a:pt x="4694324" y="18288"/>
-                </a:cubicBezTo>
-                <a:cubicBezTo>
-                  <a:pt x="4547374" y="7260"/>
-                  <a:pt x="4077675" y="7013"/>
-                  <a:pt x="3907414" y="18288"/>
-                </a:cubicBezTo>
-                <a:cubicBezTo>
-                  <a:pt x="3737153" y="29564"/>
-                  <a:pt x="3538393" y="21630"/>
-                  <a:pt x="3446122" y="18288"/>
-                </a:cubicBezTo>
-                <a:cubicBezTo>
-                  <a:pt x="3353851" y="14946"/>
-                  <a:pt x="2990320" y="-8091"/>
-                  <a:pt x="2659212" y="18288"/>
-                </a:cubicBezTo>
-                <a:cubicBezTo>
-                  <a:pt x="2328104" y="44667"/>
-                  <a:pt x="2427653" y="9607"/>
-                  <a:pt x="2306460" y="18288"/>
-                </a:cubicBezTo>
-                <a:cubicBezTo>
-                  <a:pt x="2185267" y="26969"/>
-                  <a:pt x="1719763" y="3717"/>
-                  <a:pt x="1519550" y="18288"/>
-                </a:cubicBezTo>
-                <a:cubicBezTo>
-                  <a:pt x="1319337" y="32860"/>
-                  <a:pt x="1167371" y="17040"/>
-                  <a:pt x="1058258" y="18288"/>
-                </a:cubicBezTo>
-                <a:cubicBezTo>
-                  <a:pt x="949145" y="19536"/>
-                  <a:pt x="780234" y="31447"/>
-                  <a:pt x="705505" y="18288"/>
-                </a:cubicBezTo>
-                <a:cubicBezTo>
-                  <a:pt x="630776" y="5129"/>
-                  <a:pt x="215796" y="30056"/>
-                  <a:pt x="0" y="18288"/>
-                </a:cubicBezTo>
-                <a:cubicBezTo>
-                  <a:pt x="-53" y="11301"/>
-                  <a:pt x="-649" y="7756"/>
-                  <a:pt x="0" y="0"/>
-                </a:cubicBezTo>
-                <a:close/>
-              </a:path>
-            </a:pathLst>
-          </a:custGeom>
-          <a:solidFill>
-            <a:schemeClr val="accent2"/>
-          </a:solidFill>
-          <a:ln w="41275" cap="rnd">
-            <a:solidFill>
-              <a:schemeClr val="accent2"/>
-            </a:solidFill>
-            <a:round/>
-            <a:extLst>
-              <a:ext uri="{C807C97D-BFC1-408E-A445-0C87EB9F89A2}">
-                <ask:lineSketchStyleProps xmlns:ask="http://schemas.microsoft.com/office/drawing/2018/sketchyshapes" sd="1219033472">
-                  <a:prstGeom prst="rect">
-                    <a:avLst/>
-                  </a:prstGeom>
-                  <ask:type>
-                    <ask:lineSketchFreehand/>
-                  </ask:type>
-                </ask:lineSketchStyleProps>
-              </a:ext>
-            </a:extLst>
-          </a:ln>
-        </p:spPr>
-        <p:style>
-          <a:lnRef idx="2">
-            <a:schemeClr val="accent1">
-              <a:shade val="50000"/>
-            </a:schemeClr>
-          </a:lnRef>
-          <a:fillRef idx="1">
-            <a:schemeClr val="accent1"/>
-          </a:fillRef>
-          <a:effectRef idx="0">
-            <a:schemeClr val="accent1"/>
-          </a:effectRef>
-          <a:fontRef idx="minor">
-            <a:schemeClr val="lt1"/>
-          </a:fontRef>
-        </p:style>
-        <p:txBody>
-          <a:bodyPr rtlCol="0" anchor="ctr"/>
-          <a:lstStyle/>
-          <a:p>
-            <a:pPr algn="ctr"/>
-            <a:endParaRPr lang="en-US"/>
-          </a:p>
-        </p:txBody>
-      </p:sp>
-      <p:pic>
-        <p:nvPicPr>
-          <p:cNvPr id="4" name="Picture 3">
-            <a:extLst>
-              <a:ext uri="{FF2B5EF4-FFF2-40B4-BE49-F238E27FC236}">
-                <a16:creationId xmlns:a16="http://schemas.microsoft.com/office/drawing/2014/main" id="{5CC1124C-193E-070D-4BA5-FC981E651F43}"/>
-              </a:ext>
-            </a:extLst>
-          </p:cNvPr>
-          <p:cNvPicPr>
-            <a:picLocks noChangeAspect="1"/>
-          </p:cNvPicPr>
-          <p:nvPr/>
-        </p:nvPicPr>
-        <p:blipFill>
-          <a:blip r:embed="rId2"/>
-          <a:stretch>
-            <a:fillRect/>
-          </a:stretch>
-        </p:blipFill>
-        <p:spPr>
-          <a:xfrm>
-            <a:off x="798095" y="3026119"/>
-            <a:ext cx="4818212" cy="3463090"/>
-          </a:xfrm>
-          <a:prstGeom prst="rect">
-            <a:avLst/>
-          </a:prstGeom>
-        </p:spPr>
-      </p:pic>
-      <p:pic>
-        <p:nvPicPr>
-          <p:cNvPr id="5" name="Picture 4">
-            <a:extLst>
-              <a:ext uri="{FF2B5EF4-FFF2-40B4-BE49-F238E27FC236}">
-                <a16:creationId xmlns:a16="http://schemas.microsoft.com/office/drawing/2014/main" id="{E736500A-40C2-ADC1-1678-AE62FBA340EE}"/>
-              </a:ext>
-            </a:extLst>
-          </p:cNvPr>
-          <p:cNvPicPr>
-            <a:picLocks noChangeAspect="1"/>
-          </p:cNvPicPr>
-          <p:nvPr/>
-        </p:nvPicPr>
-        <p:blipFill>
-          <a:blip r:embed="rId3"/>
-          <a:stretch>
-            <a:fillRect/>
-          </a:stretch>
-        </p:blipFill>
-        <p:spPr>
-          <a:xfrm>
-            <a:off x="6304547" y="3026119"/>
-            <a:ext cx="4957011" cy="3497586"/>
-          </a:xfrm>
-          <a:prstGeom prst="rect">
-            <a:avLst/>
-          </a:prstGeom>
-        </p:spPr>
-      </p:pic>
-      <p:cxnSp>
-        <p:nvCxnSpPr>
-          <p:cNvPr id="6" name="Straight Connector 5">
-            <a:extLst>
-              <a:ext uri="{FF2B5EF4-FFF2-40B4-BE49-F238E27FC236}">
-                <a16:creationId xmlns:a16="http://schemas.microsoft.com/office/drawing/2014/main" id="{60510445-17A5-C9B6-C228-80BB83FA8AA1}"/>
-              </a:ext>
-            </a:extLst>
-          </p:cNvPr>
-          <p:cNvCxnSpPr>
-            <a:cxnSpLocks/>
-          </p:cNvCxnSpPr>
-          <p:nvPr/>
-        </p:nvCxnSpPr>
-        <p:spPr>
-          <a:xfrm>
-            <a:off x="6930189" y="4661895"/>
-            <a:ext cx="4155627" cy="0"/>
-          </a:xfrm>
-          <a:prstGeom prst="line">
-            <a:avLst/>
-          </a:prstGeom>
-          <a:ln w="28575"/>
-        </p:spPr>
-        <p:style>
-          <a:lnRef idx="1">
-            <a:schemeClr val="accent2"/>
-          </a:lnRef>
-          <a:fillRef idx="0">
-            <a:schemeClr val="accent2"/>
-          </a:fillRef>
-          <a:effectRef idx="0">
-            <a:schemeClr val="accent2"/>
-          </a:effectRef>
-          <a:fontRef idx="minor">
-            <a:schemeClr val="tx1"/>
-          </a:fontRef>
-        </p:style>
-      </p:cxnSp>
-      <p:cxnSp>
-        <p:nvCxnSpPr>
-          <p:cNvPr id="7" name="Straight Connector 6">
-            <a:extLst>
-              <a:ext uri="{FF2B5EF4-FFF2-40B4-BE49-F238E27FC236}">
-                <a16:creationId xmlns:a16="http://schemas.microsoft.com/office/drawing/2014/main" id="{BC191EFD-5994-9240-F2DB-49FE0E291BC0}"/>
-              </a:ext>
-            </a:extLst>
-          </p:cNvPr>
-          <p:cNvCxnSpPr>
-            <a:cxnSpLocks/>
-          </p:cNvCxnSpPr>
-          <p:nvPr/>
-        </p:nvCxnSpPr>
-        <p:spPr>
-          <a:xfrm>
-            <a:off x="1339336" y="5584858"/>
-            <a:ext cx="4116242" cy="0"/>
-          </a:xfrm>
-          <a:prstGeom prst="line">
-            <a:avLst/>
-          </a:prstGeom>
-          <a:ln w="28575"/>
-        </p:spPr>
-        <p:style>
-          <a:lnRef idx="1">
-            <a:schemeClr val="accent2"/>
-          </a:lnRef>
-          <a:fillRef idx="0">
-            <a:schemeClr val="accent2"/>
-          </a:fillRef>
-          <a:effectRef idx="0">
-            <a:schemeClr val="accent2"/>
-          </a:effectRef>
-          <a:fontRef idx="minor">
-            <a:schemeClr val="tx1"/>
-          </a:fontRef>
-        </p:style>
-      </p:cxnSp>
-      <p:sp>
-        <p:nvSpPr>
-          <p:cNvPr id="9" name="Content Placeholder 2">
-            <a:extLst>
-              <a:ext uri="{FF2B5EF4-FFF2-40B4-BE49-F238E27FC236}">
-                <a16:creationId xmlns:a16="http://schemas.microsoft.com/office/drawing/2014/main" id="{E7DC8D99-7888-C565-EECC-448402BC75B1}"/>
-              </a:ext>
-            </a:extLst>
-          </p:cNvPr>
-          <p:cNvSpPr>
-            <a:spLocks noGrp="1"/>
-          </p:cNvSpPr>
-          <p:nvPr>
-            <p:ph idx="1"/>
-          </p:nvPr>
-        </p:nvSpPr>
-        <p:spPr>
-          <a:xfrm>
-            <a:off x="838200" y="1929384"/>
-            <a:ext cx="10515600" cy="4251960"/>
-          </a:xfrm>
-        </p:spPr>
-        <p:txBody>
-          <a:bodyPr>
-            <a:normAutofit/>
-          </a:bodyPr>
-          <a:lstStyle/>
-          <a:p>
-            <a:pPr marL="0" indent="0">
-              <a:buNone/>
-            </a:pPr>
-            <a:r>
-              <a:rPr lang="en-US" sz="2200" dirty="0"/>
-              <a:t>Recessions reduce growth (1.1% vs 5.0% in non-recession markets)</a:t>
-            </a:r>
-          </a:p>
-          <a:p>
-            <a:pPr marL="0" indent="0">
-              <a:buNone/>
-            </a:pPr>
-            <a:r>
-              <a:rPr lang="en-US" sz="2200" dirty="0"/>
-              <a:t>Some ZIP-codes grew even during recessions</a:t>
-            </a:r>
-          </a:p>
-        </p:txBody>
-      </p:sp>
-    </p:spTree>
-    <p:extLst>
-      <p:ext uri="{BB962C8B-B14F-4D97-AF65-F5344CB8AC3E}">
-        <p14:creationId xmlns:p14="http://schemas.microsoft.com/office/powerpoint/2010/main" val="821663497"/>
       </p:ext>
     </p:extLst>
   </p:cSld>

</xml_diff>